<commit_message>
Poster - add proper titles & colors to boxes
</commit_message>
<xml_diff>
--- a/docs/lex4all.pptx
+++ b/docs/lex4all.pptx
@@ -158,8 +158,9 @@
     </c:title>
     <c:plotArea>
       <c:layout/>
-      <c:lineChart>
-        <c:grouping val="standard"/>
+      <c:barChart>
+        <c:barDir val="col"/>
+        <c:grouping val="clustered"/>
         <c:ser>
           <c:idx val="0"/>
           <c:order val="0"/>
@@ -183,14 +184,10 @@
             </a:ln>
             <a:effectLst/>
           </c:spPr>
-          <c:marker>
-            <c:symbol val="none"/>
-          </c:marker>
           <c:dLbls>
             <c:dLbl>
               <c:idx val="3"/>
               <c:layout/>
-              <c:dLblPos val="r"/>
               <c:showVal val="1"/>
               <c:showSerName val="1"/>
               <c:extLst>
@@ -285,14 +282,10 @@
             </a:ln>
             <a:effectLst/>
           </c:spPr>
-          <c:marker>
-            <c:symbol val="none"/>
-          </c:marker>
           <c:dLbls>
             <c:dLbl>
               <c:idx val="3"/>
               <c:layout/>
-              <c:dLblPos val="r"/>
               <c:showVal val="1"/>
               <c:showSerName val="1"/>
               <c:extLst>
@@ -387,14 +380,10 @@
             </a:ln>
             <a:effectLst/>
           </c:spPr>
-          <c:marker>
-            <c:symbol val="none"/>
-          </c:marker>
           <c:dLbls>
             <c:dLbl>
               <c:idx val="3"/>
               <c:layout/>
-              <c:dLblPos val="r"/>
               <c:showVal val="1"/>
               <c:showSerName val="1"/>
               <c:extLst>
@@ -466,10 +455,9 @@
             </c:numRef>
           </c:val>
         </c:ser>
-        <c:marker val="1"/>
         <c:axId val="125003264"/>
         <c:axId val="125079552"/>
-      </c:lineChart>
+      </c:barChart>
       <c:catAx>
         <c:axId val="125003264"/>
         <c:scaling>
@@ -615,521 +603,10 @@
   </c:chart>
   <c:spPr>
     <a:noFill/>
-    <a:ln>
-      <a:noFill/>
-    </a:ln>
-    <a:effectLst/>
-  </c:spPr>
-  <c:txPr>
-    <a:bodyPr/>
-    <a:lstStyle/>
-    <a:p>
-      <a:pPr>
-        <a:defRPr/>
-      </a:pPr>
-      <a:endParaRPr lang="en-US"/>
-    </a:p>
-  </c:txPr>
-  <c:externalData r:id="rId1"/>
-</c:chartSpace>
-</file>
-
-<file path=ppt/charts/chart2.xml><?xml version="1.0" encoding="utf-8"?>
-<c:chartSpace xmlns:c="http://schemas.openxmlformats.org/drawingml/2006/chart" xmlns:a="http://schemas.openxmlformats.org/drawingml/2006/main" xmlns:r="http://schemas.openxmlformats.org/officeDocument/2006/relationships">
-  <c:date1904 val="1"/>
-  <c:lang val="en-US"/>
-  <c:chart>
-    <c:title>
-      <c:layout/>
-      <c:spPr>
-        <a:noFill/>
-        <a:ln>
-          <a:noFill/>
-        </a:ln>
-        <a:effectLst/>
-      </c:spPr>
-      <c:txPr>
-        <a:bodyPr rot="0" spcFirstLastPara="1" vertOverflow="ellipsis" vert="horz" wrap="square" anchor="ctr" anchorCtr="1"/>
-        <a:lstStyle/>
-        <a:p>
-          <a:pPr>
-            <a:defRPr lang="de-DE" sz="1862" b="0" i="0" u="none" strike="noStrike" kern="1200" spc="0" baseline="0">
-              <a:solidFill>
-                <a:schemeClr val="tx1">
-                  <a:lumMod val="65000"/>
-                  <a:lumOff val="35000"/>
-                </a:schemeClr>
-              </a:solidFill>
-              <a:latin typeface="+mn-lt"/>
-              <a:ea typeface="+mn-ea"/>
-              <a:cs typeface="+mn-cs"/>
-            </a:defRPr>
-          </a:pPr>
-          <a:endParaRPr lang="en-US"/>
-        </a:p>
-      </c:txPr>
-    </c:title>
-    <c:plotArea>
-      <c:layout/>
-      <c:lineChart>
-        <c:grouping val="standard"/>
-        <c:ser>
-          <c:idx val="0"/>
-          <c:order val="0"/>
-          <c:tx>
-            <c:strRef>
-              <c:f>Sheet1!$B$1</c:f>
-              <c:strCache>
-                <c:ptCount val="1"/>
-                <c:pt idx="0">
-                  <c:v>Series 1</c:v>
-                </c:pt>
-              </c:strCache>
-            </c:strRef>
-          </c:tx>
-          <c:spPr>
-            <a:ln w="28575" cap="rnd">
-              <a:solidFill>
-                <a:schemeClr val="accent1"/>
-              </a:solidFill>
-              <a:round/>
-            </a:ln>
-            <a:effectLst/>
-          </c:spPr>
-          <c:marker>
-            <c:symbol val="none"/>
-          </c:marker>
-          <c:dLbls>
-            <c:dLbl>
-              <c:idx val="3"/>
-              <c:layout/>
-              <c:dLblPos val="r"/>
-              <c:showVal val="1"/>
-              <c:showSerName val="1"/>
-              <c:extLst>
-                <c:ext xmlns:c15="http://schemas.microsoft.com/office/drawing/2012/chart" uri="{CE6537A1-D6FC-4f65-9D91-7224C49458BB}">
-                  <c15:layout/>
-                </c:ext>
-              </c:extLst>
-            </c:dLbl>
-            <c:delete val="1"/>
-            <c:extLst>
-              <c:ext xmlns:c15="http://schemas.microsoft.com/office/drawing/2012/chart" uri="{CE6537A1-D6FC-4f65-9D91-7224C49458BB}">
-                <c15:showLeaderLines val="1"/>
-                <c15:leaderLines>
-                  <c:spPr>
-                    <a:ln w="9525" cap="flat" cmpd="sng" algn="ctr">
-                      <a:solidFill>
-                        <a:schemeClr val="tx1">
-                          <a:lumMod val="35000"/>
-                          <a:lumOff val="65000"/>
-                        </a:schemeClr>
-                      </a:solidFill>
-                      <a:round/>
-                    </a:ln>
-                    <a:effectLst/>
-                  </c:spPr>
-                </c15:leaderLines>
-              </c:ext>
-            </c:extLst>
-          </c:dLbls>
-          <c:cat>
-            <c:strRef>
-              <c:f>Sheet1!$A$2:$A$5</c:f>
-              <c:strCache>
-                <c:ptCount val="4"/>
-                <c:pt idx="0">
-                  <c:v>Category 1</c:v>
-                </c:pt>
-                <c:pt idx="1">
-                  <c:v>Category 2</c:v>
-                </c:pt>
-                <c:pt idx="2">
-                  <c:v>Category 3</c:v>
-                </c:pt>
-                <c:pt idx="3">
-                  <c:v>Category 4</c:v>
-                </c:pt>
-              </c:strCache>
-            </c:strRef>
-          </c:cat>
-          <c:val>
-            <c:numRef>
-              <c:f>Sheet1!$B$2:$B$5</c:f>
-              <c:numCache>
-                <c:formatCode>General</c:formatCode>
-                <c:ptCount val="4"/>
-                <c:pt idx="0">
-                  <c:v>4.3</c:v>
-                </c:pt>
-                <c:pt idx="1">
-                  <c:v>2.5</c:v>
-                </c:pt>
-                <c:pt idx="2">
-                  <c:v>3.5</c:v>
-                </c:pt>
-                <c:pt idx="3">
-                  <c:v>4.5</c:v>
-                </c:pt>
-              </c:numCache>
-            </c:numRef>
-          </c:val>
-        </c:ser>
-        <c:ser>
-          <c:idx val="1"/>
-          <c:order val="1"/>
-          <c:tx>
-            <c:strRef>
-              <c:f>Sheet1!$C$1</c:f>
-              <c:strCache>
-                <c:ptCount val="1"/>
-                <c:pt idx="0">
-                  <c:v>Series 2</c:v>
-                </c:pt>
-              </c:strCache>
-            </c:strRef>
-          </c:tx>
-          <c:spPr>
-            <a:ln w="28575" cap="rnd">
-              <a:solidFill>
-                <a:schemeClr val="accent2"/>
-              </a:solidFill>
-              <a:round/>
-            </a:ln>
-            <a:effectLst/>
-          </c:spPr>
-          <c:marker>
-            <c:symbol val="none"/>
-          </c:marker>
-          <c:dLbls>
-            <c:dLbl>
-              <c:idx val="3"/>
-              <c:layout/>
-              <c:dLblPos val="r"/>
-              <c:showVal val="1"/>
-              <c:showSerName val="1"/>
-              <c:extLst>
-                <c:ext xmlns:c15="http://schemas.microsoft.com/office/drawing/2012/chart" uri="{CE6537A1-D6FC-4f65-9D91-7224C49458BB}">
-                  <c15:layout/>
-                </c:ext>
-              </c:extLst>
-            </c:dLbl>
-            <c:delete val="1"/>
-            <c:extLst>
-              <c:ext xmlns:c15="http://schemas.microsoft.com/office/drawing/2012/chart" uri="{CE6537A1-D6FC-4f65-9D91-7224C49458BB}">
-                <c15:showLeaderLines val="1"/>
-                <c15:leaderLines>
-                  <c:spPr>
-                    <a:ln w="9525" cap="flat" cmpd="sng" algn="ctr">
-                      <a:solidFill>
-                        <a:schemeClr val="tx1">
-                          <a:lumMod val="35000"/>
-                          <a:lumOff val="65000"/>
-                        </a:schemeClr>
-                      </a:solidFill>
-                      <a:round/>
-                    </a:ln>
-                    <a:effectLst/>
-                  </c:spPr>
-                </c15:leaderLines>
-              </c:ext>
-            </c:extLst>
-          </c:dLbls>
-          <c:cat>
-            <c:strRef>
-              <c:f>Sheet1!$A$2:$A$5</c:f>
-              <c:strCache>
-                <c:ptCount val="4"/>
-                <c:pt idx="0">
-                  <c:v>Category 1</c:v>
-                </c:pt>
-                <c:pt idx="1">
-                  <c:v>Category 2</c:v>
-                </c:pt>
-                <c:pt idx="2">
-                  <c:v>Category 3</c:v>
-                </c:pt>
-                <c:pt idx="3">
-                  <c:v>Category 4</c:v>
-                </c:pt>
-              </c:strCache>
-            </c:strRef>
-          </c:cat>
-          <c:val>
-            <c:numRef>
-              <c:f>Sheet1!$C$2:$C$5</c:f>
-              <c:numCache>
-                <c:formatCode>General</c:formatCode>
-                <c:ptCount val="4"/>
-                <c:pt idx="0">
-                  <c:v>2.4</c:v>
-                </c:pt>
-                <c:pt idx="1">
-                  <c:v>4.4000000000000004</c:v>
-                </c:pt>
-                <c:pt idx="2">
-                  <c:v>1.8</c:v>
-                </c:pt>
-                <c:pt idx="3">
-                  <c:v>2.8</c:v>
-                </c:pt>
-              </c:numCache>
-            </c:numRef>
-          </c:val>
-        </c:ser>
-        <c:ser>
-          <c:idx val="2"/>
-          <c:order val="2"/>
-          <c:tx>
-            <c:strRef>
-              <c:f>Sheet1!$D$1</c:f>
-              <c:strCache>
-                <c:ptCount val="1"/>
-                <c:pt idx="0">
-                  <c:v>Series 3</c:v>
-                </c:pt>
-              </c:strCache>
-            </c:strRef>
-          </c:tx>
-          <c:spPr>
-            <a:ln w="28575" cap="rnd">
-              <a:solidFill>
-                <a:schemeClr val="accent3"/>
-              </a:solidFill>
-              <a:round/>
-            </a:ln>
-            <a:effectLst/>
-          </c:spPr>
-          <c:marker>
-            <c:symbol val="none"/>
-          </c:marker>
-          <c:dLbls>
-            <c:dLbl>
-              <c:idx val="3"/>
-              <c:layout/>
-              <c:dLblPos val="r"/>
-              <c:showVal val="1"/>
-              <c:showSerName val="1"/>
-              <c:extLst>
-                <c:ext xmlns:c15="http://schemas.microsoft.com/office/drawing/2012/chart" uri="{CE6537A1-D6FC-4f65-9D91-7224C49458BB}">
-                  <c15:layout/>
-                </c:ext>
-              </c:extLst>
-            </c:dLbl>
-            <c:delete val="1"/>
-            <c:extLst>
-              <c:ext xmlns:c15="http://schemas.microsoft.com/office/drawing/2012/chart" uri="{CE6537A1-D6FC-4f65-9D91-7224C49458BB}">
-                <c15:showLeaderLines val="1"/>
-                <c15:leaderLines>
-                  <c:spPr>
-                    <a:ln w="9525" cap="flat" cmpd="sng" algn="ctr">
-                      <a:solidFill>
-                        <a:schemeClr val="tx1">
-                          <a:lumMod val="35000"/>
-                          <a:lumOff val="65000"/>
-                        </a:schemeClr>
-                      </a:solidFill>
-                      <a:round/>
-                    </a:ln>
-                    <a:effectLst/>
-                  </c:spPr>
-                </c15:leaderLines>
-              </c:ext>
-            </c:extLst>
-          </c:dLbls>
-          <c:cat>
-            <c:strRef>
-              <c:f>Sheet1!$A$2:$A$5</c:f>
-              <c:strCache>
-                <c:ptCount val="4"/>
-                <c:pt idx="0">
-                  <c:v>Category 1</c:v>
-                </c:pt>
-                <c:pt idx="1">
-                  <c:v>Category 2</c:v>
-                </c:pt>
-                <c:pt idx="2">
-                  <c:v>Category 3</c:v>
-                </c:pt>
-                <c:pt idx="3">
-                  <c:v>Category 4</c:v>
-                </c:pt>
-              </c:strCache>
-            </c:strRef>
-          </c:cat>
-          <c:val>
-            <c:numRef>
-              <c:f>Sheet1!$D$2:$D$5</c:f>
-              <c:numCache>
-                <c:formatCode>General</c:formatCode>
-                <c:ptCount val="4"/>
-                <c:pt idx="0">
-                  <c:v>2</c:v>
-                </c:pt>
-                <c:pt idx="1">
-                  <c:v>2</c:v>
-                </c:pt>
-                <c:pt idx="2">
-                  <c:v>3</c:v>
-                </c:pt>
-                <c:pt idx="3">
-                  <c:v>5</c:v>
-                </c:pt>
-              </c:numCache>
-            </c:numRef>
-          </c:val>
-        </c:ser>
-        <c:marker val="1"/>
-        <c:axId val="140147328"/>
-        <c:axId val="140538624"/>
-      </c:lineChart>
-      <c:catAx>
-        <c:axId val="140147328"/>
-        <c:scaling>
-          <c:orientation val="minMax"/>
-        </c:scaling>
-        <c:axPos val="b"/>
-        <c:numFmt formatCode="General" sourceLinked="1"/>
-        <c:majorTickMark val="none"/>
-        <c:tickLblPos val="nextTo"/>
-        <c:spPr>
-          <a:noFill/>
-          <a:ln w="9525" cap="flat" cmpd="sng" algn="ctr">
-            <a:solidFill>
-              <a:schemeClr val="tx1">
-                <a:lumMod val="15000"/>
-                <a:lumOff val="85000"/>
-              </a:schemeClr>
-            </a:solidFill>
-            <a:round/>
-          </a:ln>
-          <a:effectLst/>
-        </c:spPr>
-        <c:txPr>
-          <a:bodyPr rot="-60000000" spcFirstLastPara="1" vertOverflow="ellipsis" vert="horz" wrap="square" anchor="ctr" anchorCtr="1"/>
-          <a:lstStyle/>
-          <a:p>
-            <a:pPr>
-              <a:defRPr lang="de-DE" sz="1197" b="0" i="0" u="none" strike="noStrike" kern="1200" baseline="0">
-                <a:solidFill>
-                  <a:schemeClr val="tx1">
-                    <a:lumMod val="65000"/>
-                    <a:lumOff val="35000"/>
-                  </a:schemeClr>
-                </a:solidFill>
-                <a:latin typeface="+mn-lt"/>
-                <a:ea typeface="+mn-ea"/>
-                <a:cs typeface="+mn-cs"/>
-              </a:defRPr>
-            </a:pPr>
-            <a:endParaRPr lang="en-US"/>
-          </a:p>
-        </c:txPr>
-        <c:crossAx val="140538624"/>
-        <c:crosses val="autoZero"/>
-        <c:auto val="1"/>
-        <c:lblAlgn val="ctr"/>
-        <c:lblOffset val="100"/>
-      </c:catAx>
-      <c:valAx>
-        <c:axId val="140538624"/>
-        <c:scaling>
-          <c:orientation val="minMax"/>
-        </c:scaling>
-        <c:axPos val="l"/>
-        <c:majorGridlines>
-          <c:spPr>
-            <a:ln w="9525" cap="flat" cmpd="sng" algn="ctr">
-              <a:solidFill>
-                <a:schemeClr val="tx1">
-                  <a:lumMod val="15000"/>
-                  <a:lumOff val="85000"/>
-                </a:schemeClr>
-              </a:solidFill>
-              <a:round/>
-            </a:ln>
-            <a:effectLst/>
-          </c:spPr>
-        </c:majorGridlines>
-        <c:title>
-          <c:layout/>
-          <c:spPr>
-            <a:noFill/>
-            <a:ln>
-              <a:noFill/>
-            </a:ln>
-            <a:effectLst/>
-          </c:spPr>
-          <c:txPr>
-            <a:bodyPr rot="-5400000" spcFirstLastPara="1" vertOverflow="ellipsis" vert="horz" wrap="square" anchor="ctr" anchorCtr="1"/>
-            <a:lstStyle/>
-            <a:p>
-              <a:pPr>
-                <a:defRPr lang="de-DE" sz="1330" b="0" i="0" u="none" strike="noStrike" kern="1200" baseline="0">
-                  <a:solidFill>
-                    <a:schemeClr val="tx1">
-                      <a:lumMod val="65000"/>
-                      <a:lumOff val="35000"/>
-                    </a:schemeClr>
-                  </a:solidFill>
-                  <a:latin typeface="+mn-lt"/>
-                  <a:ea typeface="+mn-ea"/>
-                  <a:cs typeface="+mn-cs"/>
-                </a:defRPr>
-              </a:pPr>
-              <a:endParaRPr lang="en-US"/>
-            </a:p>
-          </c:txPr>
-        </c:title>
-        <c:numFmt formatCode="General" sourceLinked="1"/>
-        <c:majorTickMark val="none"/>
-        <c:tickLblPos val="nextTo"/>
-        <c:spPr>
-          <a:noFill/>
-          <a:ln>
-            <a:noFill/>
-          </a:ln>
-          <a:effectLst/>
-        </c:spPr>
-        <c:txPr>
-          <a:bodyPr rot="-60000000" spcFirstLastPara="1" vertOverflow="ellipsis" vert="horz" wrap="square" anchor="ctr" anchorCtr="1"/>
-          <a:lstStyle/>
-          <a:p>
-            <a:pPr>
-              <a:defRPr lang="de-DE" sz="1197" b="0" i="0" u="none" strike="noStrike" kern="1200" baseline="0">
-                <a:solidFill>
-                  <a:schemeClr val="tx1">
-                    <a:lumMod val="65000"/>
-                    <a:lumOff val="35000"/>
-                  </a:schemeClr>
-                </a:solidFill>
-                <a:latin typeface="+mn-lt"/>
-                <a:ea typeface="+mn-ea"/>
-                <a:cs typeface="+mn-cs"/>
-              </a:defRPr>
-            </a:pPr>
-            <a:endParaRPr lang="en-US"/>
-          </a:p>
-        </c:txPr>
-        <c:crossAx val="140147328"/>
-        <c:crosses val="autoZero"/>
-        <c:crossBetween val="between"/>
-      </c:valAx>
-      <c:spPr>
-        <a:noFill/>
-        <a:ln>
-          <a:noFill/>
-        </a:ln>
-        <a:effectLst/>
-      </c:spPr>
-    </c:plotArea>
-    <c:plotVisOnly val="1"/>
-    <c:dispBlanksAs val="gap"/>
-  </c:chart>
-  <c:spPr>
-    <a:noFill/>
-    <a:ln>
-      <a:noFill/>
+    <a:ln w="3175">
+      <a:solidFill>
+        <a:schemeClr val="accent1"/>
+      </a:solidFill>
     </a:ln>
     <a:effectLst/>
   </c:spPr>
@@ -1187,563 +664,7 @@
 </cs:colorStyle>
 </file>
 
-<file path=ppt/charts/colors2.xml><?xml version="1.0" encoding="utf-8"?>
-<cs:colorStyle xmlns:cs="http://schemas.microsoft.com/office/drawing/2012/chartStyle" xmlns:a="http://schemas.openxmlformats.org/drawingml/2006/main" meth="cycle" id="10">
-  <a:schemeClr val="accent1"/>
-  <a:schemeClr val="accent2"/>
-  <a:schemeClr val="accent3"/>
-  <a:schemeClr val="accent4"/>
-  <a:schemeClr val="accent5"/>
-  <a:schemeClr val="accent6"/>
-  <cs:variation/>
-  <cs:variation>
-    <a:lumMod val="60000"/>
-  </cs:variation>
-  <cs:variation>
-    <a:lumMod val="80000"/>
-    <a:lumOff val="20000"/>
-  </cs:variation>
-  <cs:variation>
-    <a:lumMod val="80000"/>
-  </cs:variation>
-  <cs:variation>
-    <a:lumMod val="60000"/>
-    <a:lumOff val="40000"/>
-  </cs:variation>
-  <cs:variation>
-    <a:lumMod val="50000"/>
-  </cs:variation>
-  <cs:variation>
-    <a:lumMod val="70000"/>
-    <a:lumOff val="30000"/>
-  </cs:variation>
-  <cs:variation>
-    <a:lumMod val="70000"/>
-  </cs:variation>
-  <cs:variation>
-    <a:lumMod val="50000"/>
-    <a:lumOff val="50000"/>
-  </cs:variation>
-</cs:colorStyle>
-</file>
-
 <file path=ppt/charts/style1.xml><?xml version="1.0" encoding="utf-8"?>
-<cs:chartStyle xmlns:cs="http://schemas.microsoft.com/office/drawing/2012/chartStyle" xmlns:a="http://schemas.openxmlformats.org/drawingml/2006/main" id="227">
-  <cs:axisTitle>
-    <cs:lnRef idx="0"/>
-    <cs:fillRef idx="0"/>
-    <cs:effectRef idx="0"/>
-    <cs:fontRef idx="minor">
-      <a:schemeClr val="tx1">
-        <a:lumMod val="65000"/>
-        <a:lumOff val="35000"/>
-      </a:schemeClr>
-    </cs:fontRef>
-    <cs:defRPr sz="1330" kern="1200"/>
-  </cs:axisTitle>
-  <cs:categoryAxis>
-    <cs:lnRef idx="0"/>
-    <cs:fillRef idx="0"/>
-    <cs:effectRef idx="0"/>
-    <cs:fontRef idx="minor">
-      <a:schemeClr val="tx1">
-        <a:lumMod val="65000"/>
-        <a:lumOff val="35000"/>
-      </a:schemeClr>
-    </cs:fontRef>
-    <cs:spPr>
-      <a:ln w="9525" cap="flat" cmpd="sng" algn="ctr">
-        <a:solidFill>
-          <a:schemeClr val="tx1">
-            <a:lumMod val="15000"/>
-            <a:lumOff val="85000"/>
-          </a:schemeClr>
-        </a:solidFill>
-        <a:round/>
-      </a:ln>
-    </cs:spPr>
-    <cs:defRPr sz="1197" kern="1200"/>
-  </cs:categoryAxis>
-  <cs:chartArea mods="allowNoFillOverride allowNoLineOverride">
-    <cs:lnRef idx="0"/>
-    <cs:fillRef idx="0"/>
-    <cs:effectRef idx="0"/>
-    <cs:fontRef idx="minor">
-      <a:schemeClr val="tx1"/>
-    </cs:fontRef>
-    <cs:spPr>
-      <a:solidFill>
-        <a:schemeClr val="bg1"/>
-      </a:solidFill>
-      <a:ln w="9525" cap="flat" cmpd="sng" algn="ctr">
-        <a:solidFill>
-          <a:schemeClr val="tx1">
-            <a:lumMod val="15000"/>
-            <a:lumOff val="85000"/>
-          </a:schemeClr>
-        </a:solidFill>
-        <a:round/>
-      </a:ln>
-    </cs:spPr>
-    <cs:defRPr sz="1330" kern="1200"/>
-  </cs:chartArea>
-  <cs:dataLabel>
-    <cs:lnRef idx="0"/>
-    <cs:fillRef idx="0"/>
-    <cs:effectRef idx="0"/>
-    <cs:fontRef idx="minor">
-      <a:schemeClr val="tx1">
-        <a:lumMod val="75000"/>
-        <a:lumOff val="25000"/>
-      </a:schemeClr>
-    </cs:fontRef>
-    <cs:defRPr sz="1197" kern="1200"/>
-  </cs:dataLabel>
-  <cs:dataLabelCallout>
-    <cs:lnRef idx="0"/>
-    <cs:fillRef idx="0"/>
-    <cs:effectRef idx="0"/>
-    <cs:fontRef idx="minor">
-      <a:schemeClr val="dk1">
-        <a:lumMod val="65000"/>
-        <a:lumOff val="35000"/>
-      </a:schemeClr>
-    </cs:fontRef>
-    <cs:spPr>
-      <a:solidFill>
-        <a:schemeClr val="lt1"/>
-      </a:solidFill>
-      <a:ln>
-        <a:solidFill>
-          <a:schemeClr val="dk1">
-            <a:lumMod val="25000"/>
-            <a:lumOff val="75000"/>
-          </a:schemeClr>
-        </a:solidFill>
-      </a:ln>
-    </cs:spPr>
-    <cs:defRPr sz="1197" kern="1200"/>
-    <cs:bodyPr rot="0" spcFirstLastPara="1" vertOverflow="clip" horzOverflow="clip" vert="horz" wrap="square" lIns="36576" tIns="18288" rIns="36576" bIns="18288" anchor="ctr" anchorCtr="1">
-      <a:spAutoFit/>
-    </cs:bodyPr>
-  </cs:dataLabelCallout>
-  <cs:dataPoint>
-    <cs:lnRef idx="0"/>
-    <cs:fillRef idx="1">
-      <cs:styleClr val="auto"/>
-    </cs:fillRef>
-    <cs:effectRef idx="0"/>
-    <cs:fontRef idx="minor">
-      <a:schemeClr val="tx1"/>
-    </cs:fontRef>
-    <cs:spPr>
-      <a:solidFill>
-        <a:schemeClr val="phClr"/>
-      </a:solidFill>
-    </cs:spPr>
-  </cs:dataPoint>
-  <cs:dataPoint3D>
-    <cs:lnRef idx="0"/>
-    <cs:fillRef idx="1">
-      <cs:styleClr val="auto"/>
-    </cs:fillRef>
-    <cs:effectRef idx="0"/>
-    <cs:fontRef idx="minor">
-      <a:schemeClr val="tx1"/>
-    </cs:fontRef>
-    <cs:spPr>
-      <a:solidFill>
-        <a:schemeClr val="phClr"/>
-      </a:solidFill>
-    </cs:spPr>
-  </cs:dataPoint3D>
-  <cs:dataPointLine>
-    <cs:lnRef idx="0">
-      <cs:styleClr val="auto"/>
-    </cs:lnRef>
-    <cs:fillRef idx="1"/>
-    <cs:effectRef idx="0"/>
-    <cs:fontRef idx="minor">
-      <a:schemeClr val="tx1"/>
-    </cs:fontRef>
-    <cs:spPr>
-      <a:ln w="28575" cap="rnd">
-        <a:solidFill>
-          <a:schemeClr val="phClr"/>
-        </a:solidFill>
-        <a:round/>
-      </a:ln>
-    </cs:spPr>
-  </cs:dataPointLine>
-  <cs:dataPointMarker>
-    <cs:lnRef idx="0">
-      <cs:styleClr val="auto"/>
-    </cs:lnRef>
-    <cs:fillRef idx="1">
-      <cs:styleClr val="auto"/>
-    </cs:fillRef>
-    <cs:effectRef idx="0"/>
-    <cs:fontRef idx="minor">
-      <a:schemeClr val="tx1"/>
-    </cs:fontRef>
-    <cs:spPr>
-      <a:solidFill>
-        <a:schemeClr val="phClr"/>
-      </a:solidFill>
-      <a:ln w="9525">
-        <a:solidFill>
-          <a:schemeClr val="phClr"/>
-        </a:solidFill>
-      </a:ln>
-    </cs:spPr>
-  </cs:dataPointMarker>
-  <cs:dataPointMarkerLayout symbol="circle" size="5"/>
-  <cs:dataPointWireframe>
-    <cs:lnRef idx="0">
-      <cs:styleClr val="auto"/>
-    </cs:lnRef>
-    <cs:fillRef idx="1"/>
-    <cs:effectRef idx="0"/>
-    <cs:fontRef idx="minor">
-      <a:schemeClr val="tx1"/>
-    </cs:fontRef>
-    <cs:spPr>
-      <a:ln w="9525" cap="rnd">
-        <a:solidFill>
-          <a:schemeClr val="phClr"/>
-        </a:solidFill>
-        <a:round/>
-      </a:ln>
-    </cs:spPr>
-  </cs:dataPointWireframe>
-  <cs:dataTable>
-    <cs:lnRef idx="0"/>
-    <cs:fillRef idx="0"/>
-    <cs:effectRef idx="0"/>
-    <cs:fontRef idx="minor">
-      <a:schemeClr val="tx1">
-        <a:lumMod val="65000"/>
-        <a:lumOff val="35000"/>
-      </a:schemeClr>
-    </cs:fontRef>
-    <cs:spPr>
-      <a:noFill/>
-      <a:ln w="9525" cap="flat" cmpd="sng" algn="ctr">
-        <a:solidFill>
-          <a:schemeClr val="tx1">
-            <a:lumMod val="15000"/>
-            <a:lumOff val="85000"/>
-          </a:schemeClr>
-        </a:solidFill>
-        <a:round/>
-      </a:ln>
-    </cs:spPr>
-    <cs:defRPr sz="1197" kern="1200"/>
-  </cs:dataTable>
-  <cs:downBar>
-    <cs:lnRef idx="0"/>
-    <cs:fillRef idx="0"/>
-    <cs:effectRef idx="0"/>
-    <cs:fontRef idx="minor">
-      <a:schemeClr val="dk1"/>
-    </cs:fontRef>
-    <cs:spPr>
-      <a:solidFill>
-        <a:schemeClr val="dk1">
-          <a:lumMod val="65000"/>
-          <a:lumOff val="35000"/>
-        </a:schemeClr>
-      </a:solidFill>
-      <a:ln w="9525">
-        <a:solidFill>
-          <a:schemeClr val="tx1">
-            <a:lumMod val="65000"/>
-            <a:lumOff val="35000"/>
-          </a:schemeClr>
-        </a:solidFill>
-      </a:ln>
-    </cs:spPr>
-  </cs:downBar>
-  <cs:dropLine>
-    <cs:lnRef idx="0"/>
-    <cs:fillRef idx="0"/>
-    <cs:effectRef idx="0"/>
-    <cs:fontRef idx="minor">
-      <a:schemeClr val="tx1"/>
-    </cs:fontRef>
-    <cs:spPr>
-      <a:ln w="9525" cap="flat" cmpd="sng" algn="ctr">
-        <a:solidFill>
-          <a:schemeClr val="tx1">
-            <a:lumMod val="35000"/>
-            <a:lumOff val="65000"/>
-          </a:schemeClr>
-        </a:solidFill>
-        <a:round/>
-      </a:ln>
-    </cs:spPr>
-  </cs:dropLine>
-  <cs:errorBar>
-    <cs:lnRef idx="0"/>
-    <cs:fillRef idx="0"/>
-    <cs:effectRef idx="0"/>
-    <cs:fontRef idx="minor">
-      <a:schemeClr val="tx1"/>
-    </cs:fontRef>
-    <cs:spPr>
-      <a:ln w="9525" cap="flat" cmpd="sng" algn="ctr">
-        <a:solidFill>
-          <a:schemeClr val="tx1">
-            <a:lumMod val="65000"/>
-            <a:lumOff val="35000"/>
-          </a:schemeClr>
-        </a:solidFill>
-        <a:round/>
-      </a:ln>
-    </cs:spPr>
-  </cs:errorBar>
-  <cs:floor>
-    <cs:lnRef idx="0"/>
-    <cs:fillRef idx="0"/>
-    <cs:effectRef idx="0"/>
-    <cs:fontRef idx="minor">
-      <a:schemeClr val="tx1"/>
-    </cs:fontRef>
-    <cs:spPr>
-      <a:noFill/>
-      <a:ln>
-        <a:noFill/>
-      </a:ln>
-    </cs:spPr>
-  </cs:floor>
-  <cs:gridlineMajor>
-    <cs:lnRef idx="0"/>
-    <cs:fillRef idx="0"/>
-    <cs:effectRef idx="0"/>
-    <cs:fontRef idx="minor">
-      <a:schemeClr val="tx1"/>
-    </cs:fontRef>
-    <cs:spPr>
-      <a:ln w="9525" cap="flat" cmpd="sng" algn="ctr">
-        <a:solidFill>
-          <a:schemeClr val="tx1">
-            <a:lumMod val="15000"/>
-            <a:lumOff val="85000"/>
-          </a:schemeClr>
-        </a:solidFill>
-        <a:round/>
-      </a:ln>
-    </cs:spPr>
-  </cs:gridlineMajor>
-  <cs:gridlineMinor>
-    <cs:lnRef idx="0"/>
-    <cs:fillRef idx="0"/>
-    <cs:effectRef idx="0"/>
-    <cs:fontRef idx="minor">
-      <a:schemeClr val="tx1"/>
-    </cs:fontRef>
-    <cs:spPr>
-      <a:ln w="9525" cap="flat" cmpd="sng" algn="ctr">
-        <a:solidFill>
-          <a:schemeClr val="tx1">
-            <a:lumMod val="5000"/>
-            <a:lumOff val="95000"/>
-          </a:schemeClr>
-        </a:solidFill>
-        <a:round/>
-      </a:ln>
-    </cs:spPr>
-  </cs:gridlineMinor>
-  <cs:hiLoLine>
-    <cs:lnRef idx="0"/>
-    <cs:fillRef idx="0"/>
-    <cs:effectRef idx="0"/>
-    <cs:fontRef idx="minor">
-      <a:schemeClr val="tx1"/>
-    </cs:fontRef>
-    <cs:spPr>
-      <a:ln w="9525" cap="flat" cmpd="sng" algn="ctr">
-        <a:solidFill>
-          <a:schemeClr val="tx1">
-            <a:lumMod val="75000"/>
-            <a:lumOff val="25000"/>
-          </a:schemeClr>
-        </a:solidFill>
-        <a:round/>
-      </a:ln>
-    </cs:spPr>
-  </cs:hiLoLine>
-  <cs:leaderLine>
-    <cs:lnRef idx="0"/>
-    <cs:fillRef idx="0"/>
-    <cs:effectRef idx="0"/>
-    <cs:fontRef idx="minor">
-      <a:schemeClr val="tx1"/>
-    </cs:fontRef>
-    <cs:spPr>
-      <a:ln w="9525" cap="flat" cmpd="sng" algn="ctr">
-        <a:solidFill>
-          <a:schemeClr val="tx1">
-            <a:lumMod val="35000"/>
-            <a:lumOff val="65000"/>
-          </a:schemeClr>
-        </a:solidFill>
-        <a:round/>
-      </a:ln>
-    </cs:spPr>
-  </cs:leaderLine>
-  <cs:legend>
-    <cs:lnRef idx="0"/>
-    <cs:fillRef idx="0"/>
-    <cs:effectRef idx="0"/>
-    <cs:fontRef idx="minor">
-      <a:schemeClr val="tx1">
-        <a:lumMod val="65000"/>
-        <a:lumOff val="35000"/>
-      </a:schemeClr>
-    </cs:fontRef>
-    <cs:defRPr sz="1197" kern="1200"/>
-  </cs:legend>
-  <cs:plotArea mods="allowNoFillOverride allowNoLineOverride">
-    <cs:lnRef idx="0"/>
-    <cs:fillRef idx="0"/>
-    <cs:effectRef idx="0"/>
-    <cs:fontRef idx="minor">
-      <a:schemeClr val="tx1"/>
-    </cs:fontRef>
-  </cs:plotArea>
-  <cs:plotArea3D mods="allowNoFillOverride allowNoLineOverride">
-    <cs:lnRef idx="0"/>
-    <cs:fillRef idx="0"/>
-    <cs:effectRef idx="0"/>
-    <cs:fontRef idx="minor">
-      <a:schemeClr val="tx1"/>
-    </cs:fontRef>
-  </cs:plotArea3D>
-  <cs:seriesAxis>
-    <cs:lnRef idx="0"/>
-    <cs:fillRef idx="0"/>
-    <cs:effectRef idx="0"/>
-    <cs:fontRef idx="minor">
-      <a:schemeClr val="tx1">
-        <a:lumMod val="65000"/>
-        <a:lumOff val="35000"/>
-      </a:schemeClr>
-    </cs:fontRef>
-    <cs:defRPr sz="1197" kern="1200"/>
-  </cs:seriesAxis>
-  <cs:seriesLine>
-    <cs:lnRef idx="0"/>
-    <cs:fillRef idx="0"/>
-    <cs:effectRef idx="0"/>
-    <cs:fontRef idx="minor">
-      <a:schemeClr val="tx1"/>
-    </cs:fontRef>
-    <cs:spPr>
-      <a:ln w="9525" cap="flat" cmpd="sng" algn="ctr">
-        <a:solidFill>
-          <a:schemeClr val="tx1">
-            <a:lumMod val="35000"/>
-            <a:lumOff val="65000"/>
-          </a:schemeClr>
-        </a:solidFill>
-        <a:round/>
-      </a:ln>
-    </cs:spPr>
-  </cs:seriesLine>
-  <cs:title>
-    <cs:lnRef idx="0"/>
-    <cs:fillRef idx="0"/>
-    <cs:effectRef idx="0"/>
-    <cs:fontRef idx="minor">
-      <a:schemeClr val="tx1">
-        <a:lumMod val="65000"/>
-        <a:lumOff val="35000"/>
-      </a:schemeClr>
-    </cs:fontRef>
-    <cs:defRPr sz="1862" b="0" kern="1200" spc="0" baseline="0"/>
-  </cs:title>
-  <cs:trendline>
-    <cs:lnRef idx="0">
-      <cs:styleClr val="auto"/>
-    </cs:lnRef>
-    <cs:fillRef idx="0"/>
-    <cs:effectRef idx="0"/>
-    <cs:fontRef idx="minor">
-      <a:schemeClr val="tx1"/>
-    </cs:fontRef>
-    <cs:spPr>
-      <a:ln w="19050" cap="rnd">
-        <a:solidFill>
-          <a:schemeClr val="phClr"/>
-        </a:solidFill>
-        <a:prstDash val="sysDot"/>
-      </a:ln>
-    </cs:spPr>
-  </cs:trendline>
-  <cs:trendlineLabel>
-    <cs:lnRef idx="0"/>
-    <cs:fillRef idx="0"/>
-    <cs:effectRef idx="0"/>
-    <cs:fontRef idx="minor">
-      <a:schemeClr val="tx1">
-        <a:lumMod val="65000"/>
-        <a:lumOff val="35000"/>
-      </a:schemeClr>
-    </cs:fontRef>
-    <cs:defRPr sz="1197" kern="1200"/>
-  </cs:trendlineLabel>
-  <cs:upBar>
-    <cs:lnRef idx="0"/>
-    <cs:fillRef idx="0"/>
-    <cs:effectRef idx="0"/>
-    <cs:fontRef idx="minor">
-      <a:schemeClr val="dk1"/>
-    </cs:fontRef>
-    <cs:spPr>
-      <a:solidFill>
-        <a:schemeClr val="lt1"/>
-      </a:solidFill>
-      <a:ln w="9525">
-        <a:solidFill>
-          <a:schemeClr val="tx1">
-            <a:lumMod val="15000"/>
-            <a:lumOff val="85000"/>
-          </a:schemeClr>
-        </a:solidFill>
-      </a:ln>
-    </cs:spPr>
-  </cs:upBar>
-  <cs:valueAxis>
-    <cs:lnRef idx="0"/>
-    <cs:fillRef idx="0"/>
-    <cs:effectRef idx="0"/>
-    <cs:fontRef idx="minor">
-      <a:schemeClr val="tx1">
-        <a:lumMod val="65000"/>
-        <a:lumOff val="35000"/>
-      </a:schemeClr>
-    </cs:fontRef>
-    <cs:defRPr sz="1197" kern="1200"/>
-  </cs:valueAxis>
-  <cs:wall>
-    <cs:lnRef idx="0"/>
-    <cs:fillRef idx="0"/>
-    <cs:effectRef idx="0"/>
-    <cs:fontRef idx="minor">
-      <a:schemeClr val="tx1"/>
-    </cs:fontRef>
-    <cs:spPr>
-      <a:noFill/>
-      <a:ln>
-        <a:noFill/>
-      </a:ln>
-    </cs:spPr>
-  </cs:wall>
-</cs:chartStyle>
-</file>
-
-<file path=ppt/charts/style2.xml><?xml version="1.0" encoding="utf-8"?>
 <cs:chartStyle xmlns:cs="http://schemas.microsoft.com/office/drawing/2012/chartStyle" xmlns:a="http://schemas.openxmlformats.org/drawingml/2006/main" id="227">
   <cs:axisTitle>
     <cs:lnRef idx="0"/>
@@ -6323,9 +5244,12 @@
               <a:gd name="adj" fmla="val 0"/>
             </a:avLst>
           </a:prstGeom>
+          <a:solidFill>
+            <a:schemeClr val="accent2"/>
+          </a:solidFill>
           <a:ln w="3175">
             <a:solidFill>
-              <a:schemeClr val="tx1"/>
+              <a:schemeClr val="accent2"/>
             </a:solidFill>
           </a:ln>
         </p:spPr>
@@ -6358,7 +5282,7 @@
           </a:xfrm>
           <a:ln w="3175">
             <a:solidFill>
-              <a:schemeClr val="tx1"/>
+              <a:schemeClr val="accent1"/>
             </a:solidFill>
           </a:ln>
         </p:spPr>
@@ -6493,9 +5417,12 @@
               <a:gd name="adj" fmla="val 0"/>
             </a:avLst>
           </a:prstGeom>
+          <a:solidFill>
+            <a:schemeClr val="accent3"/>
+          </a:solidFill>
           <a:ln w="3175">
             <a:solidFill>
-              <a:schemeClr val="tx1"/>
+              <a:schemeClr val="accent3"/>
             </a:solidFill>
           </a:ln>
         </p:spPr>
@@ -6524,11 +5451,11 @@
         <p:spPr>
           <a:xfrm>
             <a:off x="1143000" y="13918642"/>
-            <a:ext cx="12801600" cy="9088165"/>
+            <a:ext cx="12801600" cy="7126787"/>
           </a:xfrm>
           <a:ln w="3175">
             <a:solidFill>
-              <a:schemeClr val="tx1"/>
+              <a:schemeClr val="accent1"/>
             </a:solidFill>
           </a:ln>
         </p:spPr>
@@ -6543,6 +5470,7 @@
               <a:rPr lang="en-US" b="1" dirty="0" smtClean="0"/>
               <a:t>Add title if necessary. Click the B button on the home tab to add bold formatting.</a:t>
             </a:r>
+            <a:endParaRPr lang="en-US" b="1" dirty="0" smtClean="0"/>
           </a:p>
           <a:p>
             <a:pPr lvl="1"/>
@@ -6582,7 +5510,7 @@
         </p:nvSpPr>
         <p:spPr>
           <a:xfrm>
-            <a:off x="1143000" y="25831800"/>
+            <a:off x="1143000" y="21888450"/>
             <a:ext cx="12801600" cy="1219200"/>
           </a:xfrm>
           <a:prstGeom prst="round1Rect">
@@ -6590,9 +5518,12 @@
               <a:gd name="adj" fmla="val 0"/>
             </a:avLst>
           </a:prstGeom>
+          <a:solidFill>
+            <a:schemeClr val="accent4"/>
+          </a:solidFill>
           <a:ln w="3175">
             <a:solidFill>
-              <a:schemeClr val="tx1"/>
+              <a:schemeClr val="accent4"/>
             </a:solidFill>
           </a:ln>
         </p:spPr>
@@ -6601,8 +5532,8 @@
           <a:lstStyle/>
           <a:p>
             <a:r>
-              <a:rPr lang="en-US" smtClean="0"/>
-              <a:t>objectives</a:t>
+              <a:rPr lang="en-US" dirty="0" smtClean="0"/>
+              <a:t>System overview</a:t>
             </a:r>
             <a:endParaRPr lang="en-US" dirty="0"/>
           </a:p>
@@ -6620,12 +5551,12 @@
         </p:nvSpPr>
         <p:spPr>
           <a:xfrm>
-            <a:off x="1143000" y="27057096"/>
-            <a:ext cx="12801600" cy="3080004"/>
+            <a:off x="1143000" y="23113746"/>
+            <a:ext cx="12801600" cy="6909054"/>
           </a:xfrm>
           <a:ln w="3175">
             <a:solidFill>
-              <a:schemeClr val="tx1"/>
+              <a:schemeClr val="accent1"/>
             </a:solidFill>
           </a:ln>
         </p:spPr>
@@ -6634,25 +5565,25 @@
           <a:lstStyle/>
           <a:p>
             <a:r>
-              <a:rPr lang="en-US" smtClean="0"/>
+              <a:rPr lang="en-US" dirty="0" smtClean="0"/>
               <a:t>List objectives here</a:t>
             </a:r>
           </a:p>
           <a:p>
             <a:r>
-              <a:rPr lang="en-US" smtClean="0"/>
+              <a:rPr lang="en-US" dirty="0" smtClean="0"/>
               <a:t>Objective 1</a:t>
             </a:r>
           </a:p>
           <a:p>
             <a:r>
-              <a:rPr lang="en-US" smtClean="0"/>
+              <a:rPr lang="en-US" dirty="0" smtClean="0"/>
               <a:t>Objective 2</a:t>
             </a:r>
           </a:p>
           <a:p>
             <a:r>
-              <a:rPr lang="en-US" smtClean="0"/>
+              <a:rPr lang="en-US" dirty="0" smtClean="0"/>
               <a:t>Objective 3</a:t>
             </a:r>
             <a:endParaRPr lang="en-US" dirty="0"/>
@@ -6669,14 +5600,32 @@
             <p:ph type="body" sz="quarter" idx="21"/>
           </p:nvPr>
         </p:nvSpPr>
-        <p:spPr/>
+        <p:spPr>
+          <a:xfrm>
+            <a:off x="15544800" y="5852160"/>
+            <a:ext cx="12801600" cy="1219200"/>
+          </a:xfrm>
+          <a:prstGeom prst="round1Rect">
+            <a:avLst>
+              <a:gd name="adj" fmla="val 0"/>
+            </a:avLst>
+          </a:prstGeom>
+          <a:solidFill>
+            <a:schemeClr val="accent4"/>
+          </a:solidFill>
+          <a:ln>
+            <a:solidFill>
+              <a:schemeClr val="accent4"/>
+            </a:solidFill>
+          </a:ln>
+        </p:spPr>
         <p:txBody>
           <a:bodyPr/>
           <a:lstStyle/>
           <a:p>
             <a:r>
-              <a:rPr lang="en-US" smtClean="0"/>
-              <a:t>methods</a:t>
+              <a:rPr lang="en-US" dirty="0" smtClean="0"/>
+              <a:t>Algorithm</a:t>
             </a:r>
             <a:endParaRPr lang="en-US" dirty="0"/>
           </a:p>
@@ -6692,31 +5641,37 @@
             <p:ph sz="quarter" idx="27"/>
           </p:nvPr>
         </p:nvSpPr>
-        <p:spPr/>
+        <p:spPr>
+          <a:ln w="3175">
+            <a:solidFill>
+              <a:schemeClr val="accent1"/>
+            </a:solidFill>
+          </a:ln>
+        </p:spPr>
         <p:txBody>
           <a:bodyPr/>
           <a:lstStyle/>
           <a:p>
             <a:r>
-              <a:rPr lang="en-US" smtClean="0"/>
+              <a:rPr lang="en-US" dirty="0" smtClean="0"/>
               <a:t>List methods and descriptions here</a:t>
             </a:r>
           </a:p>
           <a:p>
             <a:r>
-              <a:rPr lang="en-US" smtClean="0"/>
+              <a:rPr lang="en-US" dirty="0" smtClean="0"/>
               <a:t>Method 1</a:t>
             </a:r>
           </a:p>
           <a:p>
             <a:r>
-              <a:rPr lang="en-US" smtClean="0"/>
+              <a:rPr lang="en-US" dirty="0" smtClean="0"/>
               <a:t>Method 2</a:t>
             </a:r>
           </a:p>
           <a:p>
             <a:r>
-              <a:rPr lang="en-US" smtClean="0"/>
+              <a:rPr lang="en-US" dirty="0" smtClean="0"/>
               <a:t>Method 3</a:t>
             </a:r>
             <a:endParaRPr lang="en-US" dirty="0"/>
@@ -7181,119 +6136,6 @@
           </a:graphicData>
         </a:graphic>
       </p:graphicFrame>
-      <p:pic>
-        <p:nvPicPr>
-          <p:cNvPr id="27" name="Picture 26" descr="Xray of spine"/>
-          <p:cNvPicPr>
-            <a:picLocks noChangeAspect="1"/>
-          </p:cNvPicPr>
-          <p:nvPr/>
-        </p:nvPicPr>
-        <p:blipFill>
-          <a:blip r:embed="rId3" cstate="print">
-            <a:extLst>
-              <a:ext uri="{28A0092B-C50C-407E-A947-70E740481C1C}">
-                <a14:useLocalDpi xmlns="" xmlns:a14="http://schemas.microsoft.com/office/drawing/2010/main" val="0"/>
-              </a:ext>
-            </a:extLst>
-          </a:blip>
-          <a:stretch>
-            <a:fillRect/>
-          </a:stretch>
-        </p:blipFill>
-        <p:spPr>
-          <a:xfrm>
-            <a:off x="15544800" y="18897600"/>
-            <a:ext cx="2834641" cy="3968496"/>
-          </a:xfrm>
-          <a:prstGeom prst="rect">
-            <a:avLst/>
-          </a:prstGeom>
-        </p:spPr>
-      </p:pic>
-      <p:pic>
-        <p:nvPicPr>
-          <p:cNvPr id="29" name="Picture 28" descr="Xray of hand"/>
-          <p:cNvPicPr>
-            <a:picLocks noChangeAspect="1"/>
-          </p:cNvPicPr>
-          <p:nvPr/>
-        </p:nvPicPr>
-        <p:blipFill>
-          <a:blip r:embed="rId4" cstate="print">
-            <a:extLst>
-              <a:ext uri="{28A0092B-C50C-407E-A947-70E740481C1C}">
-                <a14:useLocalDpi xmlns="" xmlns:a14="http://schemas.microsoft.com/office/drawing/2010/main" val="0"/>
-              </a:ext>
-            </a:extLst>
-          </a:blip>
-          <a:stretch>
-            <a:fillRect/>
-          </a:stretch>
-        </p:blipFill>
-        <p:spPr>
-          <a:xfrm>
-            <a:off x="18784949" y="18897600"/>
-            <a:ext cx="3604717" cy="3968496"/>
-          </a:xfrm>
-          <a:prstGeom prst="rect">
-            <a:avLst/>
-          </a:prstGeom>
-        </p:spPr>
-      </p:pic>
-      <p:pic>
-        <p:nvPicPr>
-          <p:cNvPr id="28" name="Picture 27" descr="Xray of head"/>
-          <p:cNvPicPr>
-            <a:picLocks noChangeAspect="1"/>
-          </p:cNvPicPr>
-          <p:nvPr/>
-        </p:nvPicPr>
-        <p:blipFill>
-          <a:blip r:embed="rId5" cstate="print">
-            <a:extLst>
-              <a:ext uri="{28A0092B-C50C-407E-A947-70E740481C1C}">
-                <a14:useLocalDpi xmlns="" xmlns:a14="http://schemas.microsoft.com/office/drawing/2010/main" val="0"/>
-              </a:ext>
-            </a:extLst>
-          </a:blip>
-          <a:stretch>
-            <a:fillRect/>
-          </a:stretch>
-        </p:blipFill>
-        <p:spPr>
-          <a:xfrm>
-            <a:off x="22795174" y="18897600"/>
-            <a:ext cx="5555894" cy="3968496"/>
-          </a:xfrm>
-          <a:prstGeom prst="rect">
-            <a:avLst/>
-          </a:prstGeom>
-        </p:spPr>
-      </p:pic>
-      <p:sp>
-        <p:nvSpPr>
-          <p:cNvPr id="15" name="Content Placeholder 14"/>
-          <p:cNvSpPr>
-            <a:spLocks noGrp="1"/>
-          </p:cNvSpPr>
-          <p:nvPr>
-            <p:ph sz="quarter" idx="28"/>
-          </p:nvPr>
-        </p:nvSpPr>
-        <p:spPr/>
-        <p:txBody>
-          <a:bodyPr/>
-          <a:lstStyle/>
-          <a:p>
-            <a:r>
-              <a:rPr lang="en-US" dirty="0" smtClean="0"/>
-              <a:t>Type a caption for the data content or pictures here.</a:t>
-            </a:r>
-            <a:endParaRPr lang="en-US" dirty="0"/>
-          </a:p>
-        </p:txBody>
-      </p:sp>
       <p:sp>
         <p:nvSpPr>
           <p:cNvPr id="16" name="Text Placeholder 15"/>
@@ -7304,14 +6146,29 @@
             <p:ph type="body" sz="quarter" idx="29"/>
           </p:nvPr>
         </p:nvSpPr>
-        <p:spPr/>
+        <p:spPr>
+          <a:xfrm>
+            <a:off x="15544800" y="18973800"/>
+            <a:ext cx="12801600" cy="1219200"/>
+          </a:xfrm>
+          <a:prstGeom prst="round1Rect">
+            <a:avLst>
+              <a:gd name="adj" fmla="val 0"/>
+            </a:avLst>
+          </a:prstGeom>
+          <a:ln w="3175">
+            <a:solidFill>
+              <a:schemeClr val="accent6"/>
+            </a:solidFill>
+          </a:ln>
+        </p:spPr>
         <p:txBody>
           <a:bodyPr/>
           <a:lstStyle/>
           <a:p>
             <a:r>
-              <a:rPr lang="en-US" smtClean="0"/>
-              <a:t>results</a:t>
+              <a:rPr lang="en-US" dirty="0" smtClean="0"/>
+              <a:t>Challenge: Running time</a:t>
             </a:r>
             <a:endParaRPr lang="en-US" dirty="0"/>
           </a:p>
@@ -7329,28 +6186,33 @@
         </p:nvSpPr>
         <p:spPr>
           <a:xfrm>
-            <a:off x="15544800" y="27057096"/>
-            <a:ext cx="12801600" cy="3080004"/>
+            <a:off x="15544800" y="20199096"/>
+            <a:ext cx="12801600" cy="9823704"/>
           </a:xfrm>
+          <a:ln w="3175">
+            <a:solidFill>
+              <a:schemeClr val="accent1"/>
+            </a:solidFill>
+          </a:ln>
         </p:spPr>
         <p:txBody>
           <a:bodyPr/>
           <a:lstStyle/>
           <a:p>
             <a:r>
-              <a:rPr lang="en-US" smtClean="0"/>
+              <a:rPr lang="en-US" dirty="0" smtClean="0"/>
               <a:t>Result 1</a:t>
             </a:r>
           </a:p>
           <a:p>
             <a:r>
-              <a:rPr lang="en-US" smtClean="0"/>
+              <a:rPr lang="en-US" dirty="0" smtClean="0"/>
               <a:t>Result 2</a:t>
             </a:r>
           </a:p>
           <a:p>
             <a:r>
-              <a:rPr lang="en-US" smtClean="0"/>
+              <a:rPr lang="en-US" dirty="0" smtClean="0"/>
               <a:t>Result 3</a:t>
             </a:r>
             <a:endParaRPr lang="en-US" dirty="0"/>
@@ -7367,14 +6229,32 @@
             <p:ph type="body" sz="quarter" idx="31"/>
           </p:nvPr>
         </p:nvSpPr>
-        <p:spPr/>
+        <p:spPr>
+          <a:xfrm>
+            <a:off x="29900880" y="5852160"/>
+            <a:ext cx="12801600" cy="1219200"/>
+          </a:xfrm>
+          <a:prstGeom prst="round1Rect">
+            <a:avLst>
+              <a:gd name="adj" fmla="val 0"/>
+            </a:avLst>
+          </a:prstGeom>
+          <a:solidFill>
+            <a:schemeClr val="accent4"/>
+          </a:solidFill>
+          <a:ln w="3175">
+            <a:solidFill>
+              <a:schemeClr val="accent4"/>
+            </a:solidFill>
+          </a:ln>
+        </p:spPr>
         <p:txBody>
           <a:bodyPr/>
           <a:lstStyle/>
           <a:p>
             <a:r>
-              <a:rPr lang="en-US" smtClean="0"/>
-              <a:t>results</a:t>
+              <a:rPr lang="en-US" dirty="0" smtClean="0"/>
+              <a:t>Additional Features</a:t>
             </a:r>
             <a:endParaRPr lang="en-US" dirty="0"/>
           </a:p>
@@ -7396,37 +6276,12 @@
           </p:nvPr>
         </p:nvGraphicFramePr>
         <p:xfrm>
-          <a:off x="29900563" y="7070725"/>
+          <a:off x="15551517" y="22545187"/>
           <a:ext cx="12801600" cy="7315200"/>
         </p:xfrm>
         <a:graphic>
           <a:graphicData uri="http://schemas.openxmlformats.org/drawingml/2006/chart">
-            <c:chart xmlns:c="http://schemas.openxmlformats.org/drawingml/2006/chart" xmlns:r="http://schemas.openxmlformats.org/officeDocument/2006/relationships" r:id="rId6"/>
-          </a:graphicData>
-        </a:graphic>
-      </p:graphicFrame>
-      <p:graphicFrame>
-        <p:nvGraphicFramePr>
-          <p:cNvPr id="32" name="Content Placeholder 31" descr="Line chart"/>
-          <p:cNvGraphicFramePr>
-            <a:graphicFrameLocks noGrp="1"/>
-          </p:cNvGraphicFramePr>
-          <p:nvPr>
-            <p:ph sz="quarter" idx="33"/>
-            <p:extLst>
-              <p:ext uri="{D42A27DB-BD31-4B8C-83A1-F6EECF244321}">
-                <p14:modId xmlns="" xmlns:p14="http://schemas.microsoft.com/office/powerpoint/2010/main" val="1978053771"/>
-              </p:ext>
-            </p:extLst>
-          </p:nvPr>
-        </p:nvGraphicFramePr>
-        <p:xfrm>
-          <a:off x="29900563" y="15836900"/>
-          <a:ext cx="12801600" cy="7315200"/>
-        </p:xfrm>
-        <a:graphic>
-          <a:graphicData uri="http://schemas.openxmlformats.org/drawingml/2006/chart">
-            <c:chart xmlns:c="http://schemas.openxmlformats.org/drawingml/2006/chart" xmlns:r="http://schemas.openxmlformats.org/officeDocument/2006/relationships" r:id="rId7"/>
+            <c:chart xmlns:c="http://schemas.openxmlformats.org/drawingml/2006/chart" xmlns:r="http://schemas.openxmlformats.org/officeDocument/2006/relationships" r:id="rId3"/>
           </a:graphicData>
         </a:graphic>
       </p:graphicFrame>
@@ -7440,14 +6295,32 @@
             <p:ph type="body" sz="quarter" idx="34"/>
           </p:nvPr>
         </p:nvSpPr>
-        <p:spPr/>
+        <p:spPr>
+          <a:xfrm>
+            <a:off x="29900880" y="25831800"/>
+            <a:ext cx="12801600" cy="1219200"/>
+          </a:xfrm>
+          <a:prstGeom prst="round1Rect">
+            <a:avLst>
+              <a:gd name="adj" fmla="val 0"/>
+            </a:avLst>
+          </a:prstGeom>
+          <a:solidFill>
+            <a:schemeClr val="accent2"/>
+          </a:solidFill>
+          <a:ln w="3175">
+            <a:solidFill>
+              <a:schemeClr val="accent2"/>
+            </a:solidFill>
+          </a:ln>
+        </p:spPr>
         <p:txBody>
           <a:bodyPr/>
           <a:lstStyle/>
           <a:p>
             <a:r>
-              <a:rPr lang="en-US" smtClean="0"/>
-              <a:t>conclusions</a:t>
+              <a:rPr lang="en-US" dirty="0" smtClean="0"/>
+              <a:t>conclusion</a:t>
             </a:r>
             <a:endParaRPr lang="en-US" dirty="0"/>
           </a:p>
@@ -7468,6 +6341,11 @@
             <a:off x="29900880" y="27057096"/>
             <a:ext cx="12801600" cy="2965704"/>
           </a:xfrm>
+          <a:ln w="3175">
+            <a:solidFill>
+              <a:schemeClr val="accent1"/>
+            </a:solidFill>
+          </a:ln>
         </p:spPr>
         <p:txBody>
           <a:bodyPr/>
@@ -7511,7 +6389,7 @@
           </a:prstGeom>
           <a:ln w="3175">
             <a:solidFill>
-              <a:schemeClr val="tx1"/>
+              <a:schemeClr val="accent1"/>
             </a:solidFill>
           </a:ln>
         </p:spPr>
@@ -7545,9 +6423,6 @@
                 <a:ln>
                   <a:noFill/>
                 </a:ln>
-                <a:solidFill>
-                  <a:schemeClr val="tx1"/>
-                </a:solidFill>
                 <a:effectLst/>
                 <a:uLnTx/>
                 <a:uFillTx/>
@@ -7561,9 +6436,6 @@
               <a:ln>
                 <a:noFill/>
               </a:ln>
-              <a:solidFill>
-                <a:schemeClr val="tx1"/>
-              </a:solidFill>
               <a:effectLst/>
               <a:uLnTx/>
               <a:uFillTx/>
@@ -7587,9 +6459,6 @@
                 <a:ln>
                   <a:noFill/>
                 </a:ln>
-                <a:solidFill>
-                  <a:schemeClr val="tx1"/>
-                </a:solidFill>
                 <a:effectLst/>
                 <a:uLnTx/>
                 <a:uFillTx/>
@@ -7679,9 +6548,6 @@
               <a:ln>
                 <a:noFill/>
               </a:ln>
-              <a:solidFill>
-                <a:schemeClr val="tx1"/>
-              </a:solidFill>
               <a:effectLst/>
               <a:uLnTx/>
               <a:uFillTx/>
@@ -7776,9 +6642,6 @@
                 <a:ln>
                   <a:noFill/>
                 </a:ln>
-                <a:solidFill>
-                  <a:schemeClr val="tx1"/>
-                </a:solidFill>
                 <a:effectLst/>
                 <a:uLnTx/>
                 <a:uFillTx/>
@@ -7794,7 +6657,7 @@
             </a:r>
             <a:r>
               <a:rPr lang="en-US" sz="2000" dirty="0" smtClean="0">
-                <a:hlinkClick r:id="rId8"/>
+                <a:hlinkClick r:id="rId4"/>
               </a:rPr>
               <a:t>http://msdn.microsoft.com/en-us/library/dd266409</a:t>
             </a:r>
@@ -7802,9 +6665,6 @@
               <a:ln>
                 <a:noFill/>
               </a:ln>
-              <a:solidFill>
-                <a:schemeClr val="tx1"/>
-              </a:solidFill>
               <a:effectLst/>
               <a:uLnTx/>
               <a:uFillTx/>
@@ -7812,6 +6672,222 @@
               <a:ea typeface="+mn-ea"/>
               <a:cs typeface="+mn-cs"/>
             </a:endParaRPr>
+          </a:p>
+        </p:txBody>
+      </p:sp>
+      <p:pic>
+        <p:nvPicPr>
+          <p:cNvPr id="30" name="Grafik 29" descr="head.png"/>
+          <p:cNvPicPr>
+            <a:picLocks noChangeAspect="1"/>
+          </p:cNvPicPr>
+          <p:nvPr/>
+        </p:nvPicPr>
+        <p:blipFill>
+          <a:blip r:embed="rId5"/>
+          <a:stretch>
+            <a:fillRect/>
+          </a:stretch>
+        </p:blipFill>
+        <p:spPr>
+          <a:xfrm>
+            <a:off x="7245521" y="14920854"/>
+            <a:ext cx="6286500" cy="6124575"/>
+          </a:xfrm>
+          <a:prstGeom prst="rect">
+            <a:avLst/>
+          </a:prstGeom>
+        </p:spPr>
+      </p:pic>
+      <p:sp>
+        <p:nvSpPr>
+          <p:cNvPr id="37" name="Text Placeholder 7"/>
+          <p:cNvSpPr txBox="1">
+            <a:spLocks/>
+          </p:cNvSpPr>
+          <p:nvPr/>
+        </p:nvSpPr>
+        <p:spPr>
+          <a:xfrm>
+            <a:off x="29887156" y="16239866"/>
+            <a:ext cx="12801600" cy="1219200"/>
+          </a:xfrm>
+          <a:prstGeom prst="round1Rect">
+            <a:avLst>
+              <a:gd name="adj" fmla="val 0"/>
+            </a:avLst>
+          </a:prstGeom>
+          <a:solidFill>
+            <a:schemeClr val="accent3"/>
+          </a:solidFill>
+          <a:ln w="3175">
+            <a:solidFill>
+              <a:schemeClr val="accent3"/>
+            </a:solidFill>
+          </a:ln>
+        </p:spPr>
+        <p:txBody>
+          <a:bodyPr vert="horz" lIns="365760" tIns="45720" rIns="91440" bIns="45720" rtlCol="0" anchor="ctr">
+            <a:noAutofit/>
+          </a:bodyPr>
+          <a:lstStyle/>
+          <a:p>
+            <a:pPr marL="0" marR="0" lvl="0" indent="0" algn="l" defTabSz="4389120" rtl="0" eaLnBrk="1" fontAlgn="auto" latinLnBrk="0" hangingPunct="1">
+              <a:lnSpc>
+                <a:spcPct val="100000"/>
+              </a:lnSpc>
+              <a:spcBef>
+                <a:spcPts val="0"/>
+              </a:spcBef>
+              <a:spcAft>
+                <a:spcPts val="0"/>
+              </a:spcAft>
+              <a:buClr>
+                <a:schemeClr val="accent2"/>
+              </a:buClr>
+              <a:buSzTx/>
+              <a:buFont typeface="Arial" panose="020B0604020202020204" pitchFamily="34" charset="0"/>
+              <a:buNone/>
+              <a:tabLst/>
+              <a:defRPr/>
+            </a:pPr>
+            <a:r>
+              <a:rPr kumimoji="0" lang="en-US" sz="6000" b="0" i="0" u="none" strike="noStrike" kern="1200" cap="all" spc="0" normalizeH="0" baseline="0" noProof="0" dirty="0" smtClean="0">
+                <a:ln>
+                  <a:noFill/>
+                </a:ln>
+                <a:solidFill>
+                  <a:schemeClr val="bg1"/>
+                </a:solidFill>
+                <a:effectLst/>
+                <a:uLnTx/>
+                <a:uFillTx/>
+                <a:latin typeface="+mj-lt"/>
+                <a:ea typeface="+mn-ea"/>
+                <a:cs typeface="+mn-cs"/>
+              </a:rPr>
+              <a:t>Future work</a:t>
+            </a:r>
+          </a:p>
+        </p:txBody>
+      </p:sp>
+      <p:sp>
+        <p:nvSpPr>
+          <p:cNvPr id="38" name="Content Placeholder 12"/>
+          <p:cNvSpPr>
+            <a:spLocks noGrp="1"/>
+          </p:cNvSpPr>
+          <p:nvPr>
+            <p:ph sz="quarter" idx="26"/>
+          </p:nvPr>
+        </p:nvSpPr>
+        <p:spPr>
+          <a:xfrm>
+            <a:off x="29887156" y="17465162"/>
+            <a:ext cx="12801600" cy="6909054"/>
+          </a:xfrm>
+          <a:ln w="3175">
+            <a:solidFill>
+              <a:schemeClr val="accent1"/>
+            </a:solidFill>
+          </a:ln>
+        </p:spPr>
+        <p:txBody>
+          <a:bodyPr/>
+          <a:lstStyle/>
+          <a:p>
+            <a:r>
+              <a:rPr lang="en-US" dirty="0" smtClean="0"/>
+              <a:t>List objectives here</a:t>
+            </a:r>
+          </a:p>
+          <a:p>
+            <a:r>
+              <a:rPr lang="en-US" dirty="0" smtClean="0"/>
+              <a:t>Objective 1</a:t>
+            </a:r>
+          </a:p>
+          <a:p>
+            <a:r>
+              <a:rPr lang="en-US" dirty="0" smtClean="0"/>
+              <a:t>Objective 2</a:t>
+            </a:r>
+          </a:p>
+          <a:p>
+            <a:r>
+              <a:rPr lang="en-US" dirty="0" smtClean="0"/>
+              <a:t>Objective 3</a:t>
+            </a:r>
+            <a:endParaRPr lang="en-US" dirty="0"/>
+          </a:p>
+        </p:txBody>
+      </p:sp>
+      <p:pic>
+        <p:nvPicPr>
+          <p:cNvPr id="39" name="Grafik 38" descr="lex4all Lexicon Builder.png"/>
+          <p:cNvPicPr>
+            <a:picLocks noChangeAspect="1"/>
+          </p:cNvPicPr>
+          <p:nvPr/>
+        </p:nvPicPr>
+        <p:blipFill>
+          <a:blip r:embed="rId6"/>
+          <a:stretch>
+            <a:fillRect/>
+          </a:stretch>
+        </p:blipFill>
+        <p:spPr>
+          <a:xfrm>
+            <a:off x="1828802" y="23335363"/>
+            <a:ext cx="10972798" cy="6548894"/>
+          </a:xfrm>
+          <a:prstGeom prst="rect">
+            <a:avLst/>
+          </a:prstGeom>
+        </p:spPr>
+      </p:pic>
+      <p:sp>
+        <p:nvSpPr>
+          <p:cNvPr id="40" name="Content Placeholder 16"/>
+          <p:cNvSpPr>
+            <a:spLocks noGrp="1"/>
+          </p:cNvSpPr>
+          <p:nvPr>
+            <p:ph sz="quarter" idx="30"/>
+          </p:nvPr>
+        </p:nvSpPr>
+        <p:spPr>
+          <a:xfrm>
+            <a:off x="29905570" y="7174522"/>
+            <a:ext cx="12801600" cy="8159263"/>
+          </a:xfrm>
+          <a:ln w="3175">
+            <a:solidFill>
+              <a:schemeClr val="accent1"/>
+            </a:solidFill>
+          </a:ln>
+        </p:spPr>
+        <p:txBody>
+          <a:bodyPr/>
+          <a:lstStyle/>
+          <a:p>
+            <a:r>
+              <a:rPr lang="en-US" dirty="0" smtClean="0"/>
+              <a:t>Result 1</a:t>
+            </a:r>
+          </a:p>
+          <a:p>
+            <a:r>
+              <a:rPr lang="en-US" dirty="0" smtClean="0"/>
+              <a:t>Result 2</a:t>
+            </a:r>
+          </a:p>
+          <a:p>
+            <a:r>
+              <a:rPr lang="en-US" dirty="0" smtClean="0"/>
+              <a:t>Result 3</a:t>
+            </a:r>
+            <a:endParaRPr lang="en-US" dirty="0"/>
           </a:p>
         </p:txBody>
       </p:sp>

</xml_diff>

<commit_message>
Fixing merge on pptx
</commit_message>
<xml_diff>
--- a/docs/lex4all.pptx
+++ b/docs/lex4all.pptx
@@ -137,7 +137,7 @@
             </a:pPr>
             <a:r>
               <a:rPr lang="en-US" dirty="0" smtClean="0"/>
-              <a:t>Evaluation</a:t>
+              <a:t>Figure 1. Evaluation</a:t>
             </a:r>
             <a:r>
               <a:rPr lang="en-US" baseline="0" dirty="0" smtClean="0"/>
@@ -185,6 +185,14 @@
               </c:strCache>
             </c:strRef>
           </c:tx>
+          <c:spPr>
+            <a:solidFill>
+              <a:schemeClr val="accent6">
+                <a:lumMod val="40000"/>
+                <a:lumOff val="60000"/>
+              </a:schemeClr>
+            </a:solidFill>
+          </c:spPr>
           <c:dLbls>
             <c:dLbl>
               <c:idx val="0"/>
@@ -270,6 +278,14 @@
               </c:strCache>
             </c:strRef>
           </c:tx>
+          <c:spPr>
+            <a:solidFill>
+              <a:schemeClr val="accent6">
+                <a:lumMod val="20000"/>
+                <a:lumOff val="80000"/>
+              </a:schemeClr>
+            </a:solidFill>
+          </c:spPr>
           <c:dLbls>
             <c:dLbl>
               <c:idx val="0"/>
@@ -354,29 +370,6 @@
           <c:orientation val="minMax"/>
         </c:scaling>
         <c:axPos val="b"/>
-        <c:title>
-          <c:tx>
-            <c:rich>
-              <a:bodyPr/>
-              <a:lstStyle/>
-              <a:p>
-                <a:pPr>
-                  <a:defRPr/>
-                </a:pPr>
-                <a:r>
-                  <a:rPr lang="en-US" dirty="0"/>
-                  <a:t>Evaluation </a:t>
-                </a:r>
-                <a:r>
-                  <a:rPr lang="en-US" dirty="0" smtClean="0"/>
-                  <a:t>Condition</a:t>
-                </a:r>
-                <a:endParaRPr lang="en-US" dirty="0"/>
-              </a:p>
-            </c:rich>
-          </c:tx>
-          <c:layout/>
-        </c:title>
         <c:numFmt formatCode="General" sourceLinked="1"/>
         <c:majorTickMark val="none"/>
         <c:tickLblPos val="nextTo"/>
@@ -5124,10 +5117,10 @@
           <a:lstStyle/>
           <a:p>
             <a:r>
-              <a:rPr lang="en-US" smtClean="0"/>
+              <a:rPr lang="en-US" b="1" dirty="0" smtClean="0"/>
               <a:t>Introduction</a:t>
             </a:r>
-            <a:endParaRPr lang="en-US" baseline="-25000" dirty="0"/>
+            <a:endParaRPr lang="en-US" b="1" baseline="-25000" dirty="0"/>
           </a:p>
         </p:txBody>
       </p:sp>
@@ -5175,7 +5168,15 @@
             </a:r>
             <a:r>
               <a:rPr lang="en-US" sz="3200" dirty="0" smtClean="0"/>
-              <a:t>an easy-to-use application that </a:t>
+              <a:t>an easy-to-use </a:t>
+            </a:r>
+            <a:r>
+              <a:rPr lang="en-US" sz="3200" dirty="0" smtClean="0"/>
+              <a:t>PC application </a:t>
+            </a:r>
+            <a:r>
+              <a:rPr lang="en-US" sz="3200" dirty="0" smtClean="0"/>
+              <a:t>that </a:t>
             </a:r>
             <a:r>
               <a:rPr lang="en-US" sz="3200" dirty="0" smtClean="0"/>
@@ -5297,10 +5298,14 @@
           <a:lstStyle/>
           <a:p>
             <a:r>
-              <a:rPr lang="en-US" dirty="0" err="1" smtClean="0"/>
+              <a:rPr lang="en-US" b="1" dirty="0" err="1" smtClean="0"/>
               <a:t>BackGround</a:t>
             </a:r>
-            <a:endParaRPr lang="en-US" dirty="0"/>
+            <a:r>
+              <a:rPr lang="en-US" b="1" dirty="0" smtClean="0"/>
+              <a:t> &amp; Goal</a:t>
+            </a:r>
+            <a:endParaRPr lang="en-US" b="1" dirty="0"/>
           </a:p>
         </p:txBody>
       </p:sp>
@@ -5316,8 +5321,8 @@
         </p:nvSpPr>
         <p:spPr>
           <a:xfrm>
-            <a:off x="1143001" y="13942088"/>
-            <a:ext cx="12801600" cy="7126787"/>
+            <a:off x="1143001" y="13935525"/>
+            <a:ext cx="12801600" cy="16025293"/>
           </a:xfrm>
           <a:ln w="3175">
             <a:solidFill>
@@ -5327,7 +5332,7 @@
         </p:spPr>
         <p:txBody>
           <a:bodyPr>
-            <a:normAutofit/>
+            <a:normAutofit lnSpcReduction="10000"/>
           </a:bodyPr>
           <a:lstStyle/>
           <a:p>
@@ -5338,12 +5343,32 @@
               <a:buNone/>
             </a:pPr>
             <a:r>
-              <a:rPr lang="en-US" dirty="0" smtClean="0"/>
-              <a:t>One of the major issues when working with LRLs is that large collections of data, e.g. speech recordings, are simply not available. Such data is, however, essential for the training of acoustic models in speech recognizers</a:t>
-            </a:r>
-            <a:r>
-              <a:rPr lang="en-US" dirty="0" smtClean="0"/>
-              <a:t>.</a:t>
+              <a:rPr lang="en-US" sz="3200" dirty="0" smtClean="0"/>
+              <a:t>Speech recognition </a:t>
+            </a:r>
+            <a:r>
+              <a:rPr lang="en-US" sz="3200" dirty="0" smtClean="0"/>
+              <a:t>interfaces can be extremely beneficial for applications in the developing world, particularly in communities where </a:t>
+            </a:r>
+            <a:r>
+              <a:rPr lang="en-US" sz="3200" dirty="0" smtClean="0"/>
+              <a:t>literacy </a:t>
+            </a:r>
+            <a:r>
+              <a:rPr lang="en-US" sz="3200" dirty="0" smtClean="0"/>
+              <a:t>rates are low or where </a:t>
+            </a:r>
+            <a:r>
+              <a:rPr lang="en-US" sz="3200" dirty="0" smtClean="0"/>
+              <a:t>PCs/internet </a:t>
+            </a:r>
+            <a:r>
+              <a:rPr lang="en-US" sz="3200" dirty="0" smtClean="0"/>
+              <a:t>connections are not always </a:t>
+            </a:r>
+            <a:r>
+              <a:rPr lang="en-US" sz="3200" dirty="0" smtClean="0"/>
+              <a:t>available [1, 2].</a:t>
             </a:r>
           </a:p>
           <a:p>
@@ -5353,7 +5378,7 @@
               </a:spcBef>
               <a:buNone/>
             </a:pPr>
-            <a:endParaRPr lang="en-US" sz="100" dirty="0" smtClean="0"/>
+            <a:endParaRPr lang="en-US" sz="3200" dirty="0" smtClean="0"/>
           </a:p>
           <a:p>
             <a:pPr marL="0">
@@ -5362,7 +5387,34 @@
               </a:spcBef>
               <a:buNone/>
             </a:pPr>
-            <a:endParaRPr lang="en-US" sz="100" dirty="0" smtClean="0"/>
+            <a:r>
+              <a:rPr lang="en-US" sz="3200" dirty="0" smtClean="0"/>
+              <a:t>Unfortunately, large speech corpora are </a:t>
+            </a:r>
+            <a:r>
+              <a:rPr lang="en-US" sz="3200" dirty="0" smtClean="0"/>
+              <a:t>simply not </a:t>
+            </a:r>
+            <a:r>
+              <a:rPr lang="en-US" sz="3200" dirty="0" smtClean="0"/>
+              <a:t>available for the LRLs spoken in such communities. </a:t>
+            </a:r>
+            <a:r>
+              <a:rPr lang="en-US" sz="3200" dirty="0" smtClean="0"/>
+              <a:t>Such data is, however, </a:t>
+            </a:r>
+            <a:r>
+              <a:rPr lang="en-US" sz="3200" dirty="0" smtClean="0"/>
+              <a:t>essential for </a:t>
+            </a:r>
+            <a:r>
+              <a:rPr lang="en-US" sz="3200" dirty="0" smtClean="0"/>
+              <a:t>the training of acoustic models in speech </a:t>
+            </a:r>
+            <a:r>
+              <a:rPr lang="en-US" sz="3200" dirty="0" smtClean="0"/>
+              <a:t>recognizers. </a:t>
+            </a:r>
           </a:p>
           <a:p>
             <a:pPr marL="0">
@@ -5371,7 +5423,7 @@
               </a:spcBef>
               <a:buNone/>
             </a:pPr>
-            <a:endParaRPr lang="en-US" sz="100" dirty="0" smtClean="0"/>
+            <a:endParaRPr lang="en-US" sz="3200" dirty="0" smtClean="0"/>
           </a:p>
           <a:p>
             <a:pPr marL="0">
@@ -5380,7 +5432,30 @@
               </a:spcBef>
               <a:buNone/>
             </a:pPr>
-            <a:endParaRPr lang="en-US" sz="100" dirty="0" smtClean="0"/>
+            <a:r>
+              <a:rPr lang="en-US" sz="3200" dirty="0" smtClean="0"/>
+              <a:t>However</a:t>
+            </a:r>
+            <a:r>
+              <a:rPr lang="en-US" sz="3200" dirty="0" smtClean="0"/>
+              <a:t>, for small-vocabulary applications (requiring recognition of a few dozen terms), we can use </a:t>
+            </a:r>
+            <a:r>
+              <a:rPr lang="en-US" sz="3200" dirty="0" smtClean="0"/>
+              <a:t>an existing recognizer trained </a:t>
+            </a:r>
+            <a:r>
+              <a:rPr lang="en-US" sz="3200" dirty="0" smtClean="0"/>
+              <a:t>for a </a:t>
+            </a:r>
+            <a:r>
+              <a:rPr lang="en-US" sz="3200" dirty="0" smtClean="0"/>
+              <a:t>HRL (e.g. the American English recognition engine of the Microsoft Speech Platform [3]) </a:t>
+            </a:r>
+            <a:r>
+              <a:rPr lang="en-US" sz="3200" dirty="0" smtClean="0"/>
+              <a:t>to accomplish recognition. </a:t>
+            </a:r>
           </a:p>
           <a:p>
             <a:pPr marL="0">
@@ -5389,7 +5464,7 @@
               </a:spcBef>
               <a:buNone/>
             </a:pPr>
-            <a:endParaRPr lang="en-US" sz="100" dirty="0" smtClean="0"/>
+            <a:endParaRPr lang="en-US" sz="3200" dirty="0" smtClean="0"/>
           </a:p>
           <a:p>
             <a:pPr marL="0">
@@ -5398,7 +5473,34 @@
               </a:spcBef>
               <a:buNone/>
             </a:pPr>
-            <a:endParaRPr lang="en-US" sz="100" dirty="0" smtClean="0"/>
+            <a:r>
+              <a:rPr lang="en-US" sz="3200" dirty="0" smtClean="0"/>
+              <a:t>The </a:t>
+            </a:r>
+            <a:r>
+              <a:rPr lang="en-US" sz="3200" dirty="0" smtClean="0"/>
+              <a:t>idea is to feed the engine </a:t>
+            </a:r>
+            <a:r>
+              <a:rPr lang="en-US" sz="3200" dirty="0" smtClean="0"/>
+              <a:t>with a </a:t>
+            </a:r>
+            <a:r>
+              <a:rPr lang="en-US" sz="3200" dirty="0" smtClean="0"/>
+              <a:t>pronunciation lexicon </a:t>
+            </a:r>
+            <a:r>
+              <a:rPr lang="en-US" sz="3200" dirty="0" smtClean="0"/>
+              <a:t>mapping </a:t>
+            </a:r>
+            <a:r>
+              <a:rPr lang="en-US" sz="3200" dirty="0" smtClean="0"/>
+              <a:t>each term in the target vocabulary to one or more sequences of phonemes in the HRL, i.e. phonemes which the recognizer can </a:t>
+            </a:r>
+            <a:r>
+              <a:rPr lang="en-US" sz="3200" dirty="0" smtClean="0"/>
+              <a:t>model.</a:t>
+            </a:r>
           </a:p>
           <a:p>
             <a:pPr marL="0">
@@ -5407,7 +5509,7 @@
               </a:spcBef>
               <a:buNone/>
             </a:pPr>
-            <a:endParaRPr lang="en-US" sz="100" dirty="0" smtClean="0"/>
+            <a:endParaRPr lang="en-US" sz="3200" dirty="0" smtClean="0"/>
           </a:p>
           <a:p>
             <a:pPr marL="0">
@@ -5416,7 +5518,7 @@
               </a:spcBef>
               <a:buNone/>
             </a:pPr>
-            <a:endParaRPr lang="en-US" sz="100" dirty="0" smtClean="0"/>
+            <a:endParaRPr lang="en-US" sz="3200" dirty="0" smtClean="0"/>
           </a:p>
           <a:p>
             <a:pPr marL="0">
@@ -5425,205 +5527,21 @@
               </a:spcBef>
               <a:buNone/>
             </a:pPr>
-            <a:endParaRPr lang="en-US" sz="100" dirty="0" smtClean="0"/>
-          </a:p>
-          <a:p>
-            <a:pPr marL="0">
-              <a:spcBef>
-                <a:spcPts val="0"/>
-              </a:spcBef>
-              <a:buNone/>
-            </a:pPr>
-            <a:endParaRPr lang="en-US" sz="100" dirty="0" smtClean="0"/>
-          </a:p>
-          <a:p>
-            <a:pPr marL="0">
-              <a:spcBef>
-                <a:spcPts val="0"/>
-              </a:spcBef>
-              <a:buNone/>
-            </a:pPr>
-            <a:endParaRPr lang="en-US" sz="100" dirty="0" smtClean="0"/>
-          </a:p>
-          <a:p>
-            <a:pPr marL="0">
-              <a:spcBef>
-                <a:spcPts val="0"/>
-              </a:spcBef>
-              <a:buNone/>
-            </a:pPr>
-            <a:endParaRPr lang="en-US" sz="100" dirty="0" smtClean="0"/>
-          </a:p>
-          <a:p>
-            <a:pPr marL="0">
-              <a:spcBef>
-                <a:spcPts val="0"/>
-              </a:spcBef>
-              <a:buNone/>
-            </a:pPr>
-            <a:endParaRPr lang="en-US" sz="100" dirty="0" smtClean="0"/>
-          </a:p>
-          <a:p>
-            <a:pPr marL="0">
-              <a:spcBef>
-                <a:spcPts val="0"/>
-              </a:spcBef>
-              <a:buNone/>
-            </a:pPr>
-            <a:endParaRPr lang="en-US" sz="100" dirty="0" smtClean="0"/>
-          </a:p>
-          <a:p>
-            <a:pPr marL="0">
-              <a:spcBef>
-                <a:spcPts val="0"/>
-              </a:spcBef>
-              <a:buNone/>
-            </a:pPr>
-            <a:endParaRPr lang="en-US" sz="100" dirty="0" smtClean="0"/>
-          </a:p>
-          <a:p>
-            <a:pPr marL="0">
-              <a:spcBef>
-                <a:spcPts val="0"/>
-              </a:spcBef>
-              <a:buNone/>
-            </a:pPr>
-            <a:r>
-              <a:rPr lang="en-US" sz="100" dirty="0" smtClean="0"/>
-              <a:t/>
-            </a:r>
-            <a:br>
-              <a:rPr lang="en-US" sz="100" dirty="0" smtClean="0"/>
-            </a:br>
-            <a:r>
-              <a:rPr lang="en-US" dirty="0" smtClean="0"/>
-              <a:t>However, for small-vocabulary applications (requiring recognition of a few dozen terms), we can use an existing, </a:t>
-            </a:r>
-            <a:r>
-              <a:rPr lang="en-US" dirty="0" smtClean="0"/>
-              <a:t> </a:t>
-            </a:r>
-            <a:r>
-              <a:rPr lang="en-US" dirty="0" smtClean="0"/>
-              <a:t>trained recognizer for a HRL such as </a:t>
-            </a:r>
-            <a:r>
-              <a:rPr lang="en-US" dirty="0" smtClean="0"/>
-              <a:t>English (e.g. the Microsoft Speech Platform recognition engine [3]) </a:t>
-            </a:r>
-            <a:r>
-              <a:rPr lang="en-US" dirty="0" smtClean="0"/>
-              <a:t>to accomplish recognition. The idea is to feed the engine </a:t>
-            </a:r>
-            <a:r>
-              <a:rPr lang="en-US" dirty="0" smtClean="0"/>
-              <a:t>with a </a:t>
-            </a:r>
-            <a:r>
-              <a:rPr lang="en-US" dirty="0" smtClean="0"/>
-              <a:t>pronunciation </a:t>
-            </a:r>
-            <a:r>
-              <a:rPr lang="en-US" dirty="0" smtClean="0"/>
-              <a:t>lexicon </a:t>
-            </a:r>
-            <a:r>
-              <a:rPr lang="en-US" dirty="0" smtClean="0"/>
-              <a:t>generated by </a:t>
-            </a:r>
-            <a:r>
-              <a:rPr lang="en-US" dirty="0" smtClean="0"/>
-              <a:t>lex4all.</a:t>
-            </a:r>
-          </a:p>
-          <a:p>
-            <a:pPr marL="0">
-              <a:spcBef>
-                <a:spcPts val="0"/>
-              </a:spcBef>
-              <a:buNone/>
-            </a:pPr>
-            <a:endParaRPr lang="en-US" dirty="0" smtClean="0"/>
-          </a:p>
-          <a:p>
-            <a:pPr marL="0">
-              <a:spcBef>
-                <a:spcPts val="0"/>
-              </a:spcBef>
-              <a:buNone/>
-            </a:pPr>
-            <a:endParaRPr lang="en-US" sz="100" dirty="0" smtClean="0"/>
-          </a:p>
-          <a:p>
-            <a:pPr marL="0">
-              <a:spcBef>
-                <a:spcPts val="0"/>
-              </a:spcBef>
-              <a:buNone/>
-            </a:pPr>
-            <a:endParaRPr lang="en-US" sz="100" dirty="0" smtClean="0"/>
-          </a:p>
-          <a:p>
-            <a:pPr marL="0">
-              <a:spcBef>
-                <a:spcPts val="0"/>
-              </a:spcBef>
-              <a:buNone/>
-            </a:pPr>
-            <a:endParaRPr lang="en-US" sz="100" dirty="0" smtClean="0"/>
-          </a:p>
-          <a:p>
-            <a:pPr marL="0">
-              <a:spcBef>
-                <a:spcPts val="0"/>
-              </a:spcBef>
-              <a:buNone/>
-            </a:pPr>
-            <a:endParaRPr lang="en-US" sz="100" dirty="0" smtClean="0"/>
-          </a:p>
-          <a:p>
-            <a:pPr marL="0">
-              <a:spcBef>
-                <a:spcPts val="0"/>
-              </a:spcBef>
-              <a:buNone/>
-            </a:pPr>
-            <a:endParaRPr lang="en-US" sz="100" dirty="0" smtClean="0"/>
-          </a:p>
-          <a:p>
-            <a:pPr marL="0">
-              <a:spcBef>
-                <a:spcPts val="0"/>
-              </a:spcBef>
-              <a:buNone/>
-            </a:pPr>
-            <a:endParaRPr lang="en-US" sz="100" dirty="0" smtClean="0"/>
-          </a:p>
-          <a:p>
-            <a:pPr marL="0">
-              <a:spcBef>
-                <a:spcPts val="0"/>
-              </a:spcBef>
-              <a:buNone/>
-            </a:pPr>
-            <a:endParaRPr lang="en-US" sz="100" dirty="0" smtClean="0"/>
-          </a:p>
-          <a:p>
-            <a:pPr marL="0">
-              <a:spcBef>
-                <a:spcPts val="0"/>
-              </a:spcBef>
-              <a:buNone/>
-            </a:pPr>
-            <a:endParaRPr lang="en-US" sz="100" dirty="0" smtClean="0"/>
-          </a:p>
-          <a:p>
-            <a:pPr>
-              <a:buNone/>
-            </a:pPr>
-            <a:r>
-              <a:rPr lang="en-US" dirty="0" smtClean="0"/>
-              <a:t>The recognition task requires:</a:t>
+            <a:r>
+              <a:rPr lang="en-US" sz="3200" dirty="0" smtClean="0"/>
+              <a:t>The </a:t>
+            </a:r>
+            <a:r>
+              <a:rPr lang="en-US" sz="3200" dirty="0" smtClean="0"/>
+              <a:t>recognition </a:t>
+            </a:r>
+            <a:r>
+              <a:rPr lang="en-US" sz="3200" dirty="0" smtClean="0"/>
+              <a:t>task requires</a:t>
+            </a:r>
+            <a:r>
+              <a:rPr lang="en-US" sz="3200" dirty="0" smtClean="0"/>
+              <a:t>:</a:t>
             </a:r>
           </a:p>
           <a:p>
@@ -5633,7 +5551,7 @@
               </a:buClr>
             </a:pPr>
             <a:r>
-              <a:rPr lang="en-US" sz="2400" dirty="0" smtClean="0"/>
+              <a:rPr lang="en-US" dirty="0" smtClean="0"/>
               <a:t>audio input in the target LRL</a:t>
             </a:r>
           </a:p>
@@ -5644,7 +5562,7 @@
               </a:buClr>
             </a:pPr>
             <a:r>
-              <a:rPr lang="en-US" sz="2400" dirty="0" smtClean="0"/>
+              <a:rPr lang="en-US" dirty="0" smtClean="0"/>
               <a:t>application-specific grammar</a:t>
             </a:r>
           </a:p>
@@ -5655,8 +5573,8 @@
               </a:buClr>
             </a:pPr>
             <a:r>
-              <a:rPr lang="en-US" sz="2400" dirty="0" smtClean="0"/>
-              <a:t>lexicon for the words in the grammar</a:t>
+              <a:rPr lang="en-US" dirty="0" smtClean="0"/>
+              <a:t>lexicon for terms in grammar</a:t>
             </a:r>
           </a:p>
           <a:p>
@@ -5666,18 +5584,50 @@
               </a:buClr>
             </a:pPr>
             <a:r>
-              <a:rPr lang="en-US" sz="2400" dirty="0" smtClean="0"/>
-              <a:t>existing  recognition engine for the HRL</a:t>
+              <a:rPr lang="en-US" dirty="0" smtClean="0"/>
+              <a:t>recognition engine for the HRL</a:t>
             </a:r>
           </a:p>
           <a:p>
             <a:pPr marL="0">
               <a:buNone/>
             </a:pPr>
-            <a:endParaRPr lang="en-US" dirty="0" smtClean="0"/>
-          </a:p>
-          <a:p>
-            <a:endParaRPr lang="en-US" dirty="0"/>
+            <a:endParaRPr lang="en-US" sz="3200" dirty="0" smtClean="0"/>
+          </a:p>
+          <a:p>
+            <a:pPr marL="0">
+              <a:buNone/>
+            </a:pPr>
+            <a:endParaRPr lang="en-US" sz="3200" dirty="0"/>
+          </a:p>
+          <a:p>
+            <a:pPr marL="0">
+              <a:buNone/>
+            </a:pPr>
+            <a:r>
+              <a:rPr lang="en-US" sz="3200" dirty="0" smtClean="0"/>
+              <a:t>Given a tool for automatically creating such lexicons, small-scale developers could add speech </a:t>
+            </a:r>
+            <a:r>
+              <a:rPr lang="en-US" sz="3200" dirty="0" smtClean="0"/>
+              <a:t>interfaces to applications in any language without large audio collections or expertise in speech technology. </a:t>
+            </a:r>
+          </a:p>
+          <a:p>
+            <a:pPr marL="0">
+              <a:buNone/>
+            </a:pPr>
+            <a:endParaRPr lang="en-US" sz="3200" dirty="0" smtClean="0"/>
+          </a:p>
+          <a:p>
+            <a:pPr marL="0">
+              <a:buNone/>
+            </a:pPr>
+            <a:r>
+              <a:rPr lang="en-US" sz="3200" dirty="0" smtClean="0"/>
+              <a:t>This is the motivation behind lex4all, a desktop application for Windows based on the Microsoft Speech Platform [3] and the Salaam algorithm for pronunciation mapping [1, 2] (see “Algorithm”).</a:t>
+            </a:r>
+            <a:endParaRPr lang="en-US" sz="3200" dirty="0" smtClean="0"/>
           </a:p>
         </p:txBody>
       </p:sp>
@@ -5693,7 +5643,7 @@
         </p:nvSpPr>
         <p:spPr>
           <a:xfrm>
-            <a:off x="1143000" y="21888450"/>
+            <a:off x="15544800" y="5852160"/>
             <a:ext cx="12801600" cy="1219200"/>
           </a:xfrm>
           <a:prstGeom prst="round1Rect">
@@ -5715,10 +5665,10 @@
           <a:lstStyle/>
           <a:p>
             <a:r>
-              <a:rPr lang="en-US" dirty="0" smtClean="0"/>
+              <a:rPr lang="en-US" b="1" dirty="0" smtClean="0"/>
               <a:t>System overview</a:t>
             </a:r>
-            <a:endParaRPr lang="en-US" dirty="0"/>
+            <a:endParaRPr lang="en-US" b="1" dirty="0"/>
           </a:p>
         </p:txBody>
       </p:sp>
@@ -5734,8 +5684,8 @@
         </p:nvSpPr>
         <p:spPr>
           <a:xfrm>
-            <a:off x="1143000" y="23113746"/>
-            <a:ext cx="12801600" cy="6909054"/>
+            <a:off x="15544800" y="7079995"/>
+            <a:ext cx="12801600" cy="7018421"/>
           </a:xfrm>
           <a:ln w="3175">
             <a:solidFill>
@@ -5751,7 +5701,7 @@
               <a:buNone/>
             </a:pPr>
             <a:r>
-              <a:rPr lang="en-US" dirty="0" smtClean="0"/>
+              <a:rPr lang="en-US" baseline="30000" dirty="0" smtClean="0"/>
               <a:t> </a:t>
             </a:r>
           </a:p>
@@ -5769,7 +5719,7 @@
         </p:nvSpPr>
         <p:spPr>
           <a:xfrm>
-            <a:off x="15544800" y="5852160"/>
+            <a:off x="15544800" y="14679636"/>
             <a:ext cx="12801600" cy="1219200"/>
           </a:xfrm>
           <a:prstGeom prst="round1Rect">
@@ -5791,10 +5741,10 @@
           <a:lstStyle/>
           <a:p>
             <a:r>
-              <a:rPr lang="en-US" dirty="0" smtClean="0"/>
+              <a:rPr lang="en-US" b="1" dirty="0" smtClean="0"/>
               <a:t>Algorithm</a:t>
             </a:r>
-            <a:endParaRPr lang="en-US" dirty="0"/>
+            <a:endParaRPr lang="en-US" b="1" dirty="0"/>
           </a:p>
         </p:txBody>
       </p:sp>
@@ -5810,7 +5760,7 @@
         </p:nvSpPr>
         <p:spPr>
           <a:xfrm>
-            <a:off x="15544800" y="7071360"/>
+            <a:off x="15544800" y="15898836"/>
             <a:ext cx="12801600" cy="8255726"/>
           </a:xfrm>
           <a:ln w="3175">
@@ -5821,7 +5771,7 @@
         </p:spPr>
         <p:txBody>
           <a:bodyPr>
-            <a:normAutofit/>
+            <a:noAutofit/>
           </a:bodyPr>
           <a:lstStyle/>
           <a:p>
@@ -5832,26 +5782,26 @@
               <a:buNone/>
             </a:pPr>
             <a:r>
-              <a:rPr lang="en-US" dirty="0" smtClean="0"/>
-              <a:t>The backend of lex4all uses the </a:t>
-            </a:r>
-            <a:r>
-              <a:rPr lang="en-US" dirty="0" smtClean="0"/>
+              <a:rPr lang="en-US" sz="3200" dirty="0" smtClean="0"/>
+              <a:t>We use the </a:t>
+            </a:r>
+            <a:r>
+              <a:rPr lang="en-US" sz="3200" dirty="0" smtClean="0"/>
               <a:t>Salaam </a:t>
             </a:r>
             <a:r>
-              <a:rPr lang="en-US" dirty="0" smtClean="0"/>
+              <a:rPr lang="en-US" sz="3200" dirty="0" smtClean="0"/>
               <a:t>method </a:t>
             </a:r>
             <a:r>
-              <a:rPr lang="en-US" dirty="0" smtClean="0"/>
+              <a:rPr lang="en-US" sz="3200" dirty="0" smtClean="0"/>
               <a:t>[1, 2] </a:t>
             </a:r>
             <a:r>
-              <a:rPr lang="en-US" dirty="0" smtClean="0"/>
+              <a:rPr lang="en-US" sz="3200" dirty="0" smtClean="0"/>
               <a:t>for the automatic discovery of the best pronunciation sequence for each word in the target vocabulary.</a:t>
             </a:r>
-            <a:endParaRPr lang="en-US" dirty="0" smtClean="0"/>
+            <a:endParaRPr lang="en-US" sz="3200" dirty="0" smtClean="0"/>
           </a:p>
           <a:p>
             <a:pPr marL="0" indent="0">
@@ -5860,7 +5810,7 @@
               </a:buClr>
               <a:buNone/>
             </a:pPr>
-            <a:endParaRPr lang="en-US" sz="1200" dirty="0" smtClean="0"/>
+            <a:endParaRPr lang="en-US" sz="1000" dirty="0" smtClean="0"/>
           </a:p>
           <a:p>
             <a:pPr marL="0" indent="0">
@@ -5870,7 +5820,7 @@
               <a:buNone/>
             </a:pPr>
             <a:r>
-              <a:rPr lang="en-US" b="1" dirty="0" smtClean="0"/>
+              <a:rPr lang="en-US" sz="3200" b="1" dirty="0" smtClean="0"/>
               <a:t>The Salaam method [1, 2]:</a:t>
             </a:r>
           </a:p>
@@ -5881,13 +5831,14 @@
               </a:buClr>
             </a:pPr>
             <a:r>
-              <a:rPr lang="en-US" dirty="0" smtClean="0"/>
-              <a:t>A “super-wildcard” grammar </a:t>
-            </a:r>
-            <a:r>
-              <a:rPr lang="en-US" dirty="0" smtClean="0"/>
-              <a:t>instructs the recognizer to treat each audio sample as a “phrase” consisting of 0-10 “words”, where each “word” is a sequence of 1-3 source-language phonemes, i.e.:</a:t>
-            </a:r>
+              <a:rPr lang="en-US" sz="3200" i="1" dirty="0" smtClean="0"/>
+              <a:t>“S</a:t>
+            </a:r>
+            <a:r>
+              <a:rPr lang="en-US" sz="3200" i="1" dirty="0" smtClean="0"/>
+              <a:t>uper-wildcard” grammar:</a:t>
+            </a:r>
+            <a:endParaRPr lang="en-US" sz="3200" i="1" dirty="0" smtClean="0"/>
           </a:p>
           <a:p>
             <a:pPr>
@@ -5895,8 +5846,23 @@
                 <a:schemeClr val="accent4"/>
               </a:buClr>
               <a:buNone/>
+              <a:tabLst>
+                <a:tab pos="457200" algn="l"/>
+                <a:tab pos="914400" algn="l"/>
+              </a:tabLst>
             </a:pPr>
-            <a:endParaRPr lang="en-US" dirty="0" smtClean="0"/>
+            <a:r>
+              <a:rPr lang="en-US" sz="3200" dirty="0" smtClean="0"/>
+              <a:t>	</a:t>
+            </a:r>
+            <a:r>
+              <a:rPr lang="en-US" sz="3200" dirty="0" smtClean="0"/>
+              <a:t>	</a:t>
+            </a:r>
+            <a:r>
+              <a:rPr lang="en-US" dirty="0" smtClean="0"/>
+              <a:t>Instructs the recognizer to treat each audio sample as a “phrase” consisting of 0-10 “words”, where each “word” is a sequence of 1-3 source-language phonemes, i.e.:</a:t>
+            </a:r>
           </a:p>
           <a:p>
             <a:pPr>
@@ -5905,6 +5871,15 @@
               </a:buClr>
               <a:buNone/>
             </a:pPr>
+            <a:endParaRPr lang="en-US" sz="1600" dirty="0" smtClean="0"/>
+          </a:p>
+          <a:p>
+            <a:pPr>
+              <a:buClr>
+                <a:schemeClr val="accent4"/>
+              </a:buClr>
+              <a:buNone/>
+            </a:pPr>
             <a:r>
               <a:rPr lang="en-US" dirty="0" smtClean="0"/>
               <a:t>	</a:t>
@@ -5913,6 +5888,7 @@
               <a:rPr lang="en-US" dirty="0" smtClean="0"/>
               <a:t>where * represents a single phoneme of the source language.</a:t>
             </a:r>
+            <a:endParaRPr lang="en-US" sz="3200" dirty="0" smtClean="0"/>
           </a:p>
           <a:p>
             <a:pPr>
@@ -5921,9 +5897,46 @@
               </a:buClr>
             </a:pPr>
             <a:r>
-              <a:rPr lang="en-US" dirty="0" smtClean="0"/>
-              <a:t>An iterative training algorithm uses the HRL recognizer and the “super-wildcard” grammar to discover the best pronunciation sequence(s) for each word in the target  (low-resource) language vocabulary, one phoneme at a time</a:t>
-            </a:r>
+              <a:rPr lang="en-US" sz="3200" i="1" dirty="0" smtClean="0"/>
+              <a:t>I</a:t>
+            </a:r>
+            <a:r>
+              <a:rPr lang="en-US" sz="3200" i="1" dirty="0" smtClean="0"/>
+              <a:t>terative training algorithm </a:t>
+            </a:r>
+          </a:p>
+          <a:p>
+            <a:pPr>
+              <a:buClr>
+                <a:schemeClr val="accent4"/>
+              </a:buClr>
+              <a:buNone/>
+              <a:tabLst>
+                <a:tab pos="457200" algn="l"/>
+                <a:tab pos="914400" algn="l"/>
+              </a:tabLst>
+            </a:pPr>
+            <a:r>
+              <a:rPr lang="en-US" sz="3200" dirty="0" smtClean="0"/>
+              <a:t>		</a:t>
+            </a:r>
+            <a:r>
+              <a:rPr lang="en-US" dirty="0" smtClean="0"/>
+              <a:t>Uses this grammar and the HRL recognizer to discover the best pronunciation sequence(s) for each word in the target vocabulary, one phoneme at a time</a:t>
+            </a:r>
+          </a:p>
+          <a:p>
+            <a:pPr>
+              <a:buClr>
+                <a:schemeClr val="accent4"/>
+              </a:buClr>
+              <a:buNone/>
+              <a:tabLst>
+                <a:tab pos="457200" algn="l"/>
+                <a:tab pos="914400" algn="l"/>
+              </a:tabLst>
+            </a:pPr>
+            <a:endParaRPr lang="en-US" sz="600" dirty="0" smtClean="0"/>
           </a:p>
           <a:p>
             <a:pPr>
@@ -5932,10 +5945,10 @@
               </a:buClr>
             </a:pPr>
             <a:r>
-              <a:rPr lang="en-US" dirty="0" smtClean="0"/>
-              <a:t>The automatically generated pronunciations yield higher recognition accuracy than pronunciations hand-written by expert linguists [1]</a:t>
-            </a:r>
-            <a:endParaRPr lang="en-US" dirty="0" smtClean="0"/>
+              <a:rPr lang="en-US" sz="3200" dirty="0" smtClean="0"/>
+              <a:t>Yields more accurate recognition than expert-written pronunciations[1]</a:t>
+            </a:r>
+            <a:endParaRPr lang="en-US" sz="3200" dirty="0" smtClean="0"/>
           </a:p>
         </p:txBody>
       </p:sp>
@@ -5951,7 +5964,7 @@
         </p:nvSpPr>
         <p:spPr>
           <a:xfrm>
-            <a:off x="15544800" y="17302657"/>
+            <a:off x="29876818" y="5845303"/>
             <a:ext cx="12801600" cy="1219200"/>
           </a:xfrm>
           <a:prstGeom prst="round1Rect">
@@ -5959,9 +5972,12 @@
               <a:gd name="adj" fmla="val 0"/>
             </a:avLst>
           </a:prstGeom>
+          <a:solidFill>
+            <a:schemeClr val="accent3"/>
+          </a:solidFill>
           <a:ln w="3175">
             <a:solidFill>
-              <a:schemeClr val="accent6"/>
+              <a:schemeClr val="accent3"/>
             </a:solidFill>
           </a:ln>
         </p:spPr>
@@ -5970,10 +5986,10 @@
           <a:lstStyle/>
           <a:p>
             <a:r>
-              <a:rPr lang="en-US" dirty="0" smtClean="0"/>
+              <a:rPr lang="en-US" b="1" dirty="0" smtClean="0"/>
               <a:t>Challenge: Running time</a:t>
             </a:r>
-            <a:endParaRPr lang="en-US" dirty="0"/>
+            <a:endParaRPr lang="en-US" b="1" dirty="0"/>
           </a:p>
         </p:txBody>
       </p:sp>
@@ -5989,8 +6005,8 @@
         </p:nvSpPr>
         <p:spPr>
           <a:xfrm>
-            <a:off x="15544800" y="18540248"/>
-            <a:ext cx="12801600" cy="11482552"/>
+            <a:off x="29876818" y="7082893"/>
+            <a:ext cx="12801600" cy="12285761"/>
           </a:xfrm>
           <a:ln w="3175">
             <a:solidFill>
@@ -6076,14 +6092,39 @@
               <a:rPr lang="en-US" sz="2800" u="sng" dirty="0" smtClean="0"/>
               <a:t>2-5 minutes</a:t>
             </a:r>
+            <a:r>
+              <a:rPr lang="en-US" sz="2800" dirty="0" smtClean="0"/>
+              <a:t> (≈20x </a:t>
+            </a:r>
+            <a:r>
+              <a:rPr lang="en-US" sz="2800" dirty="0" smtClean="0"/>
+              <a:t>faster)</a:t>
+            </a:r>
+            <a:endParaRPr lang="en-US" sz="2800" u="sng" dirty="0" smtClean="0"/>
+          </a:p>
+          <a:p>
+            <a:r>
+              <a:rPr lang="en-US" sz="3200" dirty="0" smtClean="0"/>
+              <a:t>Evaluation</a:t>
+            </a:r>
           </a:p>
           <a:p>
             <a:pPr lvl="1"/>
             <a:r>
               <a:rPr lang="en-US" sz="2800" dirty="0" smtClean="0"/>
-              <a:t>Result: ≈20x faster training, no significant drop in recognition accuracy</a:t>
-            </a:r>
-            <a:endParaRPr lang="en-US" dirty="0"/>
+              <a:t>Tested on Yoruba data (25 words, 2 speakers, 5 samples/word/speaker)</a:t>
+            </a:r>
+          </a:p>
+          <a:p>
+            <a:pPr lvl="1"/>
+            <a:r>
+              <a:rPr lang="en-US" sz="2800" dirty="0" smtClean="0"/>
+              <a:t>Result: n</a:t>
+            </a:r>
+            <a:r>
+              <a:rPr lang="en-US" sz="2800" dirty="0" smtClean="0"/>
+              <a:t>o significant drop in recognition accuracy (see Figure 1)</a:t>
+            </a:r>
           </a:p>
         </p:txBody>
       </p:sp>
@@ -6099,7 +6140,7 @@
         </p:nvSpPr>
         <p:spPr>
           <a:xfrm>
-            <a:off x="29900880" y="5852160"/>
+            <a:off x="15535545" y="24663707"/>
             <a:ext cx="12801600" cy="1219200"/>
           </a:xfrm>
           <a:prstGeom prst="round1Rect">
@@ -6121,10 +6162,10 @@
           <a:lstStyle/>
           <a:p>
             <a:r>
-              <a:rPr lang="en-US" dirty="0" smtClean="0"/>
+              <a:rPr lang="en-US" b="1" dirty="0" smtClean="0"/>
               <a:t>Additional Features</a:t>
             </a:r>
-            <a:endParaRPr lang="en-US" dirty="0"/>
+            <a:endParaRPr lang="en-US" b="1" dirty="0"/>
           </a:p>
         </p:txBody>
       </p:sp>
@@ -6144,7 +6185,7 @@
           </p:nvPr>
         </p:nvGraphicFramePr>
         <p:xfrm>
-          <a:off x="16390841" y="24949308"/>
+          <a:off x="30764423" y="14697300"/>
           <a:ext cx="11060678" cy="5047827"/>
         </p:xfrm>
         <a:graphic>
@@ -6165,7 +6206,7 @@
         </p:nvSpPr>
         <p:spPr>
           <a:xfrm>
-            <a:off x="29900880" y="24439406"/>
+            <a:off x="29900880" y="20079850"/>
             <a:ext cx="12801600" cy="1219200"/>
           </a:xfrm>
           <a:prstGeom prst="round1Rect">
@@ -6187,10 +6228,10 @@
           <a:lstStyle/>
           <a:p>
             <a:r>
-              <a:rPr lang="en-US" dirty="0" smtClean="0"/>
-              <a:t>conclusion</a:t>
-            </a:r>
-            <a:endParaRPr lang="en-US" dirty="0"/>
+              <a:rPr lang="en-US" b="1" dirty="0" smtClean="0"/>
+              <a:t>Conclusion &amp; Future Work</a:t>
+            </a:r>
+            <a:endParaRPr lang="en-US" b="1" dirty="0"/>
           </a:p>
         </p:txBody>
       </p:sp>
@@ -6206,8 +6247,8 @@
         </p:nvSpPr>
         <p:spPr>
           <a:xfrm>
-            <a:off x="29900880" y="25686327"/>
-            <a:ext cx="12801600" cy="4336473"/>
+            <a:off x="29900880" y="21322145"/>
+            <a:ext cx="12801600" cy="8700655"/>
           </a:xfrm>
           <a:ln w="3175">
             <a:solidFill>
@@ -6226,7 +6267,7 @@
             </a:pPr>
             <a:r>
               <a:rPr lang="en-US" sz="3200" dirty="0" smtClean="0"/>
-              <a:t>The lex4all tool enables the rapid and automatic creation of pronunciation lexicons in any low-resource language, using an out-of-the-box commercial recognition engine [3] for a high-resource language (English) and an existing algorithm for cross-language pronunciation mapping [1, 2].</a:t>
+              <a:t>The lex4all tool enables the rapid and automatic creation of pronunciation lexicons in any LRL, using an out-of-the-box commercial recognizer [3] for a HRL (English) and an existing algorithm for cross-language pronunciation mapping [1, 2].</a:t>
             </a:r>
           </a:p>
           <a:p>
@@ -6241,9 +6282,89 @@
             </a:pPr>
             <a:r>
               <a:rPr lang="en-US" sz="3200" dirty="0" smtClean="0"/>
-              <a:t>We hope that this tool will help developers to create speech interfaces for applications in low-resource languages, as well as facilitate research in small-vocabulary speech recognition for such languages.</a:t>
-            </a:r>
-            <a:endParaRPr lang="en-US" sz="3200" dirty="0"/>
+              <a:t>We hope that this tool will help developers create speech interfaces for applications in LRL, as well as facilitate research in small-vocabulary speech recognition for such languages.</a:t>
+            </a:r>
+            <a:endParaRPr lang="en-US" sz="100" dirty="0" smtClean="0"/>
+          </a:p>
+          <a:p>
+            <a:pPr marL="0">
+              <a:buNone/>
+            </a:pPr>
+            <a:endParaRPr lang="en-US" sz="100" dirty="0" smtClean="0"/>
+          </a:p>
+          <a:p>
+            <a:pPr marL="0">
+              <a:buNone/>
+            </a:pPr>
+            <a:endParaRPr lang="en-US" sz="100" dirty="0" smtClean="0"/>
+          </a:p>
+          <a:p>
+            <a:pPr>
+              <a:buClr>
+                <a:schemeClr val="accent3"/>
+              </a:buClr>
+              <a:buNone/>
+            </a:pPr>
+            <a:r>
+              <a:rPr lang="en-US" sz="3200" dirty="0" smtClean="0"/>
+              <a:t>Possible future extensions of the project include:</a:t>
+            </a:r>
+          </a:p>
+          <a:p>
+            <a:pPr>
+              <a:buClr>
+                <a:schemeClr val="accent3"/>
+              </a:buClr>
+            </a:pPr>
+            <a:r>
+              <a:rPr lang="en-US" sz="3200" b="1" dirty="0" smtClean="0"/>
+              <a:t>Online lexicon repository</a:t>
+            </a:r>
+          </a:p>
+          <a:p>
+            <a:pPr>
+              <a:buClr>
+                <a:schemeClr val="accent3"/>
+              </a:buClr>
+              <a:buNone/>
+            </a:pPr>
+            <a:r>
+              <a:rPr lang="en-US" sz="3200" dirty="0" smtClean="0"/>
+              <a:t>	</a:t>
+            </a:r>
+            <a:r>
+              <a:rPr lang="en-US" dirty="0" smtClean="0"/>
+              <a:t>Adding an option for users to upload created lexicons to an online repository would allow sharing and re-use of lexicons across languages/language families.</a:t>
+            </a:r>
+            <a:endParaRPr lang="en-US" sz="3200" dirty="0" smtClean="0"/>
+          </a:p>
+          <a:p>
+            <a:pPr>
+              <a:buClr>
+                <a:schemeClr val="accent3"/>
+              </a:buClr>
+            </a:pPr>
+            <a:r>
+              <a:rPr lang="en-US" sz="3200" b="1" dirty="0" smtClean="0"/>
+              <a:t>Additional source-language recognizers</a:t>
+            </a:r>
+          </a:p>
+          <a:p>
+            <a:pPr>
+              <a:buClr>
+                <a:schemeClr val="accent3"/>
+              </a:buClr>
+              <a:buNone/>
+            </a:pPr>
+            <a:r>
+              <a:rPr lang="en-US" sz="3200" dirty="0" smtClean="0"/>
+              <a:t>	</a:t>
+            </a:r>
+            <a:r>
+              <a:rPr lang="en-US" dirty="0" smtClean="0"/>
+              <a:t>Microsoft offers recognizers in over 20 languages [3]. Using a source language that is more similar to the target language could improve recognition accuracy.</a:t>
+            </a:r>
+            <a:endParaRPr lang="en-US" dirty="0"/>
           </a:p>
         </p:txBody>
       </p:sp>
@@ -6257,8 +6378,8 @@
         </p:nvSpPr>
         <p:spPr>
           <a:xfrm>
-            <a:off x="1143000" y="30632400"/>
-            <a:ext cx="41559163" cy="1565701"/>
+            <a:off x="1143001" y="30632400"/>
+            <a:ext cx="27161836" cy="1565701"/>
           </a:xfrm>
           <a:prstGeom prst="rect">
             <a:avLst/>
@@ -6271,7 +6392,7 @@
         </p:spPr>
         <p:txBody>
           <a:bodyPr vert="horz" lIns="365760" tIns="182880" rIns="91440" bIns="45720" rtlCol="0">
-            <a:normAutofit fontScale="85000" lnSpcReduction="20000"/>
+            <a:noAutofit/>
           </a:bodyPr>
           <a:lstStyle/>
           <a:p>
@@ -6279,9 +6400,6 @@
               <a:lnSpc>
                 <a:spcPct val="100000"/>
               </a:lnSpc>
-              <a:spcBef>
-                <a:spcPts val="1200"/>
-              </a:spcBef>
               <a:spcAft>
                 <a:spcPts val="0"/>
               </a:spcAft>
@@ -6295,7 +6413,7 @@
               <a:defRPr/>
             </a:pPr>
             <a:r>
-              <a:rPr kumimoji="0" lang="en-US" sz="2000" b="1" i="0" u="none" strike="noStrike" kern="1200" cap="none" spc="0" normalizeH="0" baseline="0" noProof="0" dirty="0" smtClean="0">
+              <a:rPr kumimoji="0" lang="en-US" sz="2800" b="1" i="0" u="none" strike="noStrike" kern="1200" cap="none" spc="0" normalizeH="0" baseline="0" noProof="0" dirty="0" smtClean="0">
                 <a:ln>
                   <a:noFill/>
                 </a:ln>
@@ -6308,7 +6426,7 @@
               </a:rPr>
               <a:t>References</a:t>
             </a:r>
-            <a:endParaRPr kumimoji="0" lang="en-US" sz="2000" b="0" i="0" u="none" strike="noStrike" kern="1200" cap="none" spc="0" normalizeH="0" baseline="0" noProof="0" dirty="0" smtClean="0">
+            <a:endParaRPr kumimoji="0" lang="en-US" sz="600" b="0" i="0" u="none" strike="noStrike" kern="1200" cap="none" spc="0" normalizeH="0" baseline="0" noProof="0" dirty="0" smtClean="0">
               <a:ln>
                 <a:noFill/>
               </a:ln>
@@ -6322,16 +6440,13 @@
           </a:p>
           <a:p>
             <a:pPr marL="457200" lvl="0" indent="-457200" defTabSz="4389120">
-              <a:spcBef>
-                <a:spcPts val="1200"/>
-              </a:spcBef>
               <a:buClr>
                 <a:schemeClr val="accent2"/>
               </a:buClr>
               <a:defRPr/>
             </a:pPr>
             <a:r>
-              <a:rPr kumimoji="0" lang="en-US" sz="2000" b="0" i="0" u="none" strike="noStrike" kern="1200" cap="none" spc="0" normalizeH="0" baseline="0" noProof="0" dirty="0" smtClean="0">
+              <a:rPr kumimoji="0" lang="en-US" sz="1900" b="0" i="0" u="none" strike="noStrike" kern="1200" cap="none" spc="0" normalizeH="0" baseline="0" noProof="0" dirty="0" smtClean="0">
                 <a:ln>
                   <a:noFill/>
                 </a:ln>
@@ -6345,82 +6460,82 @@
               <a:t>[1</a:t>
             </a:r>
             <a:r>
-              <a:rPr lang="en-US" sz="2000" dirty="0" smtClean="0"/>
+              <a:rPr lang="en-US" sz="1900" dirty="0" smtClean="0"/>
               <a:t>] Fang </a:t>
             </a:r>
             <a:r>
-              <a:rPr lang="en-US" sz="2000" dirty="0" err="1" smtClean="0"/>
+              <a:rPr lang="en-US" sz="1900" dirty="0" err="1" smtClean="0"/>
               <a:t>Qiao</a:t>
             </a:r>
             <a:r>
-              <a:rPr lang="en-US" sz="2000" dirty="0" smtClean="0"/>
+              <a:rPr lang="en-US" sz="1900" dirty="0" smtClean="0"/>
               <a:t>, </a:t>
             </a:r>
             <a:r>
-              <a:rPr lang="en-US" sz="2000" dirty="0" err="1" smtClean="0"/>
+              <a:rPr lang="en-US" sz="1900" dirty="0" err="1" smtClean="0"/>
               <a:t>Jahanzeb</a:t>
             </a:r>
             <a:r>
-              <a:rPr lang="en-US" sz="2000" dirty="0" smtClean="0"/>
+              <a:rPr lang="en-US" sz="1900" dirty="0" smtClean="0"/>
               <a:t> </a:t>
             </a:r>
             <a:r>
-              <a:rPr lang="en-US" sz="2000" dirty="0" err="1" smtClean="0"/>
+              <a:rPr lang="en-US" sz="1900" dirty="0" err="1" smtClean="0"/>
               <a:t>Sherwani</a:t>
             </a:r>
             <a:r>
-              <a:rPr lang="en-US" sz="2000" dirty="0" smtClean="0"/>
+              <a:rPr lang="en-US" sz="1900" dirty="0" smtClean="0"/>
               <a:t>, and </a:t>
             </a:r>
             <a:r>
-              <a:rPr lang="en-US" sz="2000" dirty="0" err="1" smtClean="0"/>
+              <a:rPr lang="en-US" sz="1900" dirty="0" err="1" smtClean="0"/>
               <a:t>Roni</a:t>
             </a:r>
             <a:r>
-              <a:rPr lang="en-US" sz="2000" dirty="0" smtClean="0"/>
+              <a:rPr lang="en-US" sz="1900" dirty="0" smtClean="0"/>
               <a:t> Rosenfeld</a:t>
             </a:r>
             <a:r>
-              <a:rPr lang="en-US" sz="2000" dirty="0" smtClean="0"/>
+              <a:rPr lang="en-US" sz="1900" dirty="0" smtClean="0"/>
               <a:t>, 2010. </a:t>
             </a:r>
             <a:r>
-              <a:rPr lang="en-US" sz="2000" dirty="0" smtClean="0"/>
+              <a:rPr lang="en-US" sz="1900" dirty="0" smtClean="0"/>
               <a:t>“Small-vocabulary speech recognition for resource- scarce languages,” in </a:t>
             </a:r>
             <a:r>
-              <a:rPr lang="en-US" sz="2000" i="1" dirty="0" smtClean="0"/>
+              <a:rPr lang="en-US" sz="1900" i="1" dirty="0" smtClean="0"/>
               <a:t>Proceedings of the First ACM Symposium on Computing for </a:t>
             </a:r>
             <a:r>
-              <a:rPr lang="en-US" sz="2000" i="1" dirty="0" smtClean="0"/>
+              <a:rPr lang="en-US" sz="1900" i="1" dirty="0" smtClean="0"/>
               <a:t>Development (ACM DEV ‘10)</a:t>
             </a:r>
             <a:r>
-              <a:rPr lang="en-US" sz="2000" i="1" dirty="0" smtClean="0"/>
+              <a:rPr lang="en-US" sz="1900" i="1" dirty="0" smtClean="0"/>
               <a:t>.</a:t>
             </a:r>
             <a:r>
-              <a:rPr lang="en-US" sz="2000" dirty="0" smtClean="0"/>
+              <a:rPr lang="en-US" sz="1900" dirty="0" smtClean="0"/>
               <a:t> ACM, New </a:t>
             </a:r>
             <a:r>
-              <a:rPr lang="en-US" sz="2000" dirty="0" smtClean="0"/>
+              <a:rPr lang="en-US" sz="1900" dirty="0" smtClean="0"/>
               <a:t>York, NY, USA, </a:t>
             </a:r>
             <a:r>
-              <a:rPr lang="en-US" sz="2000" dirty="0" smtClean="0"/>
+              <a:rPr lang="en-US" sz="1900" dirty="0" smtClean="0"/>
               <a:t>pp</a:t>
             </a:r>
             <a:r>
-              <a:rPr lang="en-US" sz="2000" dirty="0" smtClean="0"/>
+              <a:rPr lang="en-US" sz="1900" dirty="0" smtClean="0"/>
               <a:t>. </a:t>
             </a:r>
             <a:r>
-              <a:rPr lang="en-US" sz="2000" dirty="0" smtClean="0"/>
+              <a:rPr lang="en-US" sz="1900" dirty="0" smtClean="0"/>
               <a:t>3:1–3:8.</a:t>
             </a:r>
-            <a:endParaRPr kumimoji="0" lang="en-US" sz="2000" b="0" i="0" u="none" strike="noStrike" kern="1200" cap="none" spc="0" normalizeH="0" baseline="0" noProof="0" dirty="0" smtClean="0">
+            <a:endParaRPr kumimoji="0" lang="en-US" sz="1900" b="0" i="0" u="none" strike="noStrike" kern="1200" cap="none" spc="0" normalizeH="0" baseline="0" noProof="0" dirty="0" smtClean="0">
               <a:ln>
                 <a:noFill/>
               </a:ln>
@@ -6434,87 +6549,81 @@
           </a:p>
           <a:p>
             <a:pPr marL="457200" lvl="0" indent="-457200" defTabSz="4389120">
-              <a:spcBef>
-                <a:spcPts val="1200"/>
-              </a:spcBef>
               <a:buClr>
                 <a:schemeClr val="accent2"/>
               </a:buClr>
               <a:defRPr/>
             </a:pPr>
             <a:r>
-              <a:rPr lang="en-US" sz="2000" dirty="0" smtClean="0"/>
+              <a:rPr lang="en-US" sz="1900" dirty="0" smtClean="0"/>
               <a:t>[2</a:t>
             </a:r>
             <a:r>
-              <a:rPr lang="en-US" sz="2000" dirty="0" smtClean="0"/>
+              <a:rPr lang="en-US" sz="1900" dirty="0" smtClean="0"/>
               <a:t>] </a:t>
             </a:r>
             <a:r>
-              <a:rPr lang="en-US" sz="2000" dirty="0" err="1" smtClean="0"/>
+              <a:rPr lang="en-US" sz="1900" dirty="0" err="1" smtClean="0"/>
               <a:t>Hao</a:t>
             </a:r>
             <a:r>
-              <a:rPr lang="en-US" sz="2000" dirty="0" smtClean="0"/>
+              <a:rPr lang="en-US" sz="1900" dirty="0" smtClean="0"/>
               <a:t> Yee Chan and </a:t>
             </a:r>
             <a:r>
-              <a:rPr lang="en-US" sz="2000" dirty="0" err="1" smtClean="0"/>
+              <a:rPr lang="en-US" sz="1900" dirty="0" err="1" smtClean="0"/>
               <a:t>Roni</a:t>
             </a:r>
             <a:r>
-              <a:rPr lang="en-US" sz="2000" dirty="0" smtClean="0"/>
+              <a:rPr lang="en-US" sz="1900" dirty="0" smtClean="0"/>
               <a:t> Rosenfeld</a:t>
             </a:r>
             <a:r>
-              <a:rPr lang="en-US" sz="2000" dirty="0" smtClean="0"/>
+              <a:rPr lang="en-US" sz="1900" dirty="0" smtClean="0"/>
               <a:t>, 2012. </a:t>
             </a:r>
             <a:r>
-              <a:rPr lang="en-US" sz="2000" dirty="0" smtClean="0"/>
+              <a:rPr lang="en-US" sz="1900" dirty="0" smtClean="0"/>
               <a:t>“Discriminative pronunciation learning for speech recognition for resource scarce languages,” in </a:t>
             </a:r>
             <a:r>
-              <a:rPr lang="en-US" sz="2000" i="1" dirty="0" smtClean="0"/>
+              <a:rPr lang="en-US" sz="1900" i="1" dirty="0" smtClean="0"/>
               <a:t>Proceedings of the 2nd ACM Symposium on Computing for </a:t>
             </a:r>
             <a:r>
-              <a:rPr lang="en-US" sz="2000" i="1" dirty="0" smtClean="0"/>
+              <a:rPr lang="en-US" sz="1900" i="1" dirty="0" smtClean="0"/>
               <a:t>Development (ACM DEV ‘12)</a:t>
             </a:r>
             <a:r>
-              <a:rPr lang="en-US" sz="2000" dirty="0" smtClean="0"/>
+              <a:rPr lang="en-US" sz="1900" dirty="0" smtClean="0"/>
               <a:t>. ACM, New </a:t>
             </a:r>
             <a:r>
-              <a:rPr lang="en-US" sz="2000" dirty="0" smtClean="0"/>
+              <a:rPr lang="en-US" sz="1900" dirty="0" smtClean="0"/>
               <a:t>York, NY, USA, </a:t>
             </a:r>
             <a:r>
-              <a:rPr lang="en-US" sz="2000" dirty="0" smtClean="0"/>
+              <a:rPr lang="en-US" sz="1900" dirty="0" smtClean="0"/>
               <a:t>pp</a:t>
             </a:r>
             <a:r>
-              <a:rPr lang="en-US" sz="2000" dirty="0" smtClean="0"/>
-              <a:t>. 12:1–12:6</a:t>
-            </a:r>
-            <a:r>
-              <a:rPr lang="en-US" sz="2000" dirty="0" smtClean="0"/>
-              <a:t>,. </a:t>
+              <a:rPr lang="en-US" sz="1900" dirty="0" smtClean="0"/>
+              <a:t>. </a:t>
+            </a:r>
+            <a:r>
+              <a:rPr lang="en-US" sz="1900" dirty="0" smtClean="0"/>
+              <a:t>12:1–12:6. </a:t>
             </a:r>
           </a:p>
           <a:p>
             <a:pPr marL="457200" lvl="0" indent="-457200" defTabSz="4389120">
-              <a:spcBef>
-                <a:spcPts val="1200"/>
-              </a:spcBef>
               <a:buClr>
                 <a:schemeClr val="accent2"/>
               </a:buClr>
               <a:defRPr/>
             </a:pPr>
             <a:r>
-              <a:rPr kumimoji="0" lang="en-US" sz="2000" b="0" i="0" u="none" strike="noStrike" kern="1200" cap="none" spc="0" normalizeH="0" baseline="0" noProof="0" dirty="0" smtClean="0">
+              <a:rPr kumimoji="0" lang="en-US" sz="1900" b="0" i="0" u="none" strike="noStrike" kern="1200" cap="none" spc="0" normalizeH="0" baseline="0" noProof="0" dirty="0" smtClean="0">
                 <a:ln>
                   <a:noFill/>
                 </a:ln>
@@ -6528,16 +6637,16 @@
               <a:t>[3] </a:t>
             </a:r>
             <a:r>
-              <a:rPr lang="en-US" sz="2000" dirty="0" smtClean="0"/>
+              <a:rPr lang="en-US" sz="1900" dirty="0" smtClean="0"/>
               <a:t>Microsoft, 2012. Microsoft Speech Platform SDK 11 Documentation. </a:t>
             </a:r>
             <a:r>
-              <a:rPr lang="en-US" sz="2000" dirty="0" smtClean="0">
+              <a:rPr lang="en-US" sz="1900" dirty="0" smtClean="0">
                 <a:hlinkClick r:id="rId5"/>
               </a:rPr>
               <a:t>http://msdn.microsoft.com/en-us/library/dd266409</a:t>
             </a:r>
-            <a:endParaRPr kumimoji="0" lang="en-US" sz="2000" b="0" i="0" u="none" strike="noStrike" kern="1200" cap="none" spc="0" normalizeH="0" baseline="0" noProof="0" dirty="0">
+            <a:endParaRPr kumimoji="0" lang="en-US" sz="1900" b="0" i="0" u="none" strike="noStrike" kern="1200" cap="none" spc="0" normalizeH="0" baseline="0" noProof="0" dirty="0">
               <a:ln>
                 <a:noFill/>
               </a:ln>
@@ -6561,200 +6670,21 @@
         </p:nvPicPr>
         <p:blipFill>
           <a:blip r:embed="rId6"/>
-          <a:srcRect l="2909" t="35832" r="11636" b="10451"/>
+          <a:srcRect l="2909" t="31353" r="10182" b="5972"/>
           <a:stretch>
             <a:fillRect/>
           </a:stretch>
         </p:blipFill>
         <p:spPr>
           <a:xfrm>
-            <a:off x="8018582" y="17497124"/>
-            <a:ext cx="5693011" cy="3486428"/>
+            <a:off x="7652084" y="21476834"/>
+            <a:ext cx="6101507" cy="4286768"/>
           </a:xfrm>
           <a:prstGeom prst="rect">
             <a:avLst/>
           </a:prstGeom>
         </p:spPr>
       </p:pic>
-      <p:sp>
-        <p:nvSpPr>
-          <p:cNvPr id="37" name="Text Placeholder 7"/>
-          <p:cNvSpPr txBox="1">
-            <a:spLocks/>
-          </p:cNvSpPr>
-          <p:nvPr/>
-        </p:nvSpPr>
-        <p:spPr>
-          <a:xfrm>
-            <a:off x="29887156" y="16239866"/>
-            <a:ext cx="12801600" cy="1219200"/>
-          </a:xfrm>
-          <a:prstGeom prst="round1Rect">
-            <a:avLst>
-              <a:gd name="adj" fmla="val 0"/>
-            </a:avLst>
-          </a:prstGeom>
-          <a:solidFill>
-            <a:schemeClr val="accent3"/>
-          </a:solidFill>
-          <a:ln w="3175">
-            <a:solidFill>
-              <a:schemeClr val="accent3"/>
-            </a:solidFill>
-          </a:ln>
-        </p:spPr>
-        <p:txBody>
-          <a:bodyPr vert="horz" lIns="365760" tIns="45720" rIns="91440" bIns="45720" rtlCol="0" anchor="ctr">
-            <a:noAutofit/>
-          </a:bodyPr>
-          <a:lstStyle/>
-          <a:p>
-            <a:pPr marL="0" marR="0" lvl="0" indent="0" algn="l" defTabSz="4389120" rtl="0" eaLnBrk="1" fontAlgn="auto" latinLnBrk="0" hangingPunct="1">
-              <a:lnSpc>
-                <a:spcPct val="100000"/>
-              </a:lnSpc>
-              <a:spcBef>
-                <a:spcPts val="0"/>
-              </a:spcBef>
-              <a:spcAft>
-                <a:spcPts val="0"/>
-              </a:spcAft>
-              <a:buClr>
-                <a:schemeClr val="accent2"/>
-              </a:buClr>
-              <a:buSzTx/>
-              <a:buFont typeface="Arial" panose="020B0604020202020204" pitchFamily="34" charset="0"/>
-              <a:buNone/>
-              <a:tabLst/>
-              <a:defRPr/>
-            </a:pPr>
-            <a:r>
-              <a:rPr kumimoji="0" lang="en-US" sz="6000" b="0" i="0" u="none" strike="noStrike" kern="1200" cap="all" spc="0" normalizeH="0" baseline="0" noProof="0" dirty="0" smtClean="0">
-                <a:ln>
-                  <a:noFill/>
-                </a:ln>
-                <a:solidFill>
-                  <a:schemeClr val="bg1"/>
-                </a:solidFill>
-                <a:effectLst/>
-                <a:uLnTx/>
-                <a:uFillTx/>
-                <a:latin typeface="+mj-lt"/>
-                <a:ea typeface="+mn-ea"/>
-                <a:cs typeface="+mn-cs"/>
-              </a:rPr>
-              <a:t>Future work</a:t>
-            </a:r>
-          </a:p>
-        </p:txBody>
-      </p:sp>
-      <p:sp>
-        <p:nvSpPr>
-          <p:cNvPr id="38" name="Content Placeholder 12"/>
-          <p:cNvSpPr>
-            <a:spLocks noGrp="1"/>
-          </p:cNvSpPr>
-          <p:nvPr>
-            <p:ph sz="quarter" idx="26"/>
-          </p:nvPr>
-        </p:nvSpPr>
-        <p:spPr>
-          <a:xfrm>
-            <a:off x="29887156" y="17465162"/>
-            <a:ext cx="12801600" cy="5928238"/>
-          </a:xfrm>
-          <a:ln w="3175">
-            <a:solidFill>
-              <a:schemeClr val="accent1"/>
-            </a:solidFill>
-          </a:ln>
-        </p:spPr>
-        <p:txBody>
-          <a:bodyPr/>
-          <a:lstStyle/>
-          <a:p>
-            <a:pPr>
-              <a:buClr>
-                <a:schemeClr val="accent3"/>
-              </a:buClr>
-              <a:buNone/>
-            </a:pPr>
-            <a:r>
-              <a:rPr lang="en-US" dirty="0" smtClean="0"/>
-              <a:t>Possible future extensions of the project include:</a:t>
-            </a:r>
-            <a:endParaRPr lang="en-US" dirty="0" smtClean="0"/>
-          </a:p>
-          <a:p>
-            <a:pPr>
-              <a:buClr>
-                <a:schemeClr val="accent3"/>
-              </a:buClr>
-            </a:pPr>
-            <a:r>
-              <a:rPr lang="en-US" b="1" dirty="0" smtClean="0"/>
-              <a:t>Online lexicon repository</a:t>
-            </a:r>
-          </a:p>
-          <a:p>
-            <a:pPr>
-              <a:buClr>
-                <a:schemeClr val="accent3"/>
-              </a:buClr>
-              <a:buNone/>
-            </a:pPr>
-            <a:r>
-              <a:rPr lang="en-US" dirty="0" smtClean="0"/>
-              <a:t>	</a:t>
-            </a:r>
-            <a:r>
-              <a:rPr lang="en-US" dirty="0" smtClean="0"/>
-              <a:t>Adding an option for users to upload their created lexicons to a central web repository  would allow sharing and re-use of lexicons across languages and language families.</a:t>
-            </a:r>
-            <a:endParaRPr lang="en-US" dirty="0" smtClean="0"/>
-          </a:p>
-          <a:p>
-            <a:pPr>
-              <a:buClr>
-                <a:schemeClr val="accent3"/>
-              </a:buClr>
-            </a:pPr>
-            <a:r>
-              <a:rPr lang="en-US" b="1" dirty="0" smtClean="0"/>
-              <a:t>Additional source-language recognizers</a:t>
-            </a:r>
-          </a:p>
-          <a:p>
-            <a:pPr>
-              <a:buClr>
-                <a:schemeClr val="accent3"/>
-              </a:buClr>
-              <a:buNone/>
-            </a:pPr>
-            <a:r>
-              <a:rPr lang="en-US" dirty="0" smtClean="0"/>
-              <a:t>	</a:t>
-            </a:r>
-            <a:r>
-              <a:rPr lang="en-US" dirty="0" smtClean="0"/>
-              <a:t>The Microsoft Speech Platform currently supports recognition in over 20 different (high-resource) languages [3]. It is possible that using a source language that shares more phonemes with the target language could improve recognition accuracy, though this topic calls for further research.</a:t>
-            </a:r>
-            <a:endParaRPr lang="en-US" dirty="0" smtClean="0"/>
-          </a:p>
-          <a:p>
-            <a:pPr>
-              <a:buClr>
-                <a:schemeClr val="accent3"/>
-              </a:buClr>
-            </a:pPr>
-            <a:r>
-              <a:rPr lang="en-US" b="1" dirty="0" smtClean="0"/>
-              <a:t>User interface improvements</a:t>
-            </a:r>
-            <a:endParaRPr lang="en-US" b="1" dirty="0"/>
-          </a:p>
-        </p:txBody>
-      </p:sp>
       <p:pic>
         <p:nvPicPr>
           <p:cNvPr id="39" name="Grafik 38" descr="lex4all Lexicon Builder.png"/>
@@ -6765,14 +6695,15 @@
         </p:nvPicPr>
         <p:blipFill>
           <a:blip r:embed="rId7"/>
+          <a:srcRect b="18667"/>
           <a:stretch>
             <a:fillRect/>
           </a:stretch>
         </p:blipFill>
         <p:spPr>
           <a:xfrm>
-            <a:off x="2331722" y="23171368"/>
-            <a:ext cx="10328280" cy="6835563"/>
+            <a:off x="16513386" y="7317607"/>
+            <a:ext cx="10944014" cy="6675708"/>
           </a:xfrm>
           <a:prstGeom prst="rect">
             <a:avLst/>
@@ -6791,8 +6722,8 @@
         </p:nvSpPr>
         <p:spPr>
           <a:xfrm>
-            <a:off x="29905570" y="7083083"/>
-            <a:ext cx="12801600" cy="4452426"/>
+            <a:off x="15565073" y="25909732"/>
+            <a:ext cx="12801600" cy="4120042"/>
           </a:xfrm>
           <a:ln w="3175">
             <a:solidFill>
@@ -6801,7 +6732,9 @@
           </a:ln>
         </p:spPr>
         <p:txBody>
-          <a:bodyPr/>
+          <a:bodyPr>
+            <a:normAutofit/>
+          </a:bodyPr>
           <a:lstStyle/>
           <a:p>
             <a:pPr fontAlgn="base">
@@ -6810,10 +6743,14 @@
               </a:buClr>
             </a:pPr>
             <a:r>
-              <a:rPr lang="en-US" b="1" dirty="0" smtClean="0"/>
-              <a:t>Evaluation module </a:t>
-            </a:r>
-            <a:endParaRPr lang="en-US" b="1" dirty="0" smtClean="0"/>
+              <a:rPr lang="en-US" sz="3200" b="1" dirty="0" smtClean="0"/>
+              <a:t>Discriminative training </a:t>
+            </a:r>
+            <a:r>
+              <a:rPr lang="en-US" sz="3200" dirty="0" smtClean="0"/>
+              <a:t>[2] </a:t>
+            </a:r>
+            <a:endParaRPr lang="en-US" sz="3200" dirty="0" smtClean="0"/>
           </a:p>
           <a:p>
             <a:pPr fontAlgn="base">
@@ -6824,23 +6761,23 @@
             </a:pPr>
             <a:r>
               <a:rPr lang="en-US" dirty="0" smtClean="0"/>
-              <a:t>	A</a:t>
-            </a:r>
-            <a:r>
-              <a:rPr lang="en-US" dirty="0" smtClean="0"/>
-              <a:t>llows </a:t>
-            </a:r>
-            <a:r>
-              <a:rPr lang="en-US" dirty="0" smtClean="0"/>
-              <a:t>the user to test </a:t>
-            </a:r>
-            <a:r>
-              <a:rPr lang="en-US" dirty="0" smtClean="0"/>
-              <a:t>built </a:t>
-            </a:r>
-            <a:r>
-              <a:rPr lang="en-US" dirty="0" smtClean="0"/>
-              <a:t>lexicons in recognizing real audio</a:t>
+              <a:t>	</a:t>
+            </a:r>
+            <a:r>
+              <a:rPr lang="en-US" dirty="0" smtClean="0"/>
+              <a:t>An </a:t>
+            </a:r>
+            <a:r>
+              <a:rPr lang="en-US" dirty="0" smtClean="0"/>
+              <a:t>additional </a:t>
+            </a:r>
+            <a:r>
+              <a:rPr lang="en-US" dirty="0" smtClean="0"/>
+              <a:t>training step removes pronunciations in </a:t>
+            </a:r>
+            <a:r>
+              <a:rPr lang="en-US" dirty="0" smtClean="0"/>
+              <a:t>the lexicon that may reduce recognition accuracy by matching multiple words in the vocabulary</a:t>
             </a:r>
           </a:p>
           <a:p>
@@ -6850,10 +6787,14 @@
               </a:buClr>
             </a:pPr>
             <a:r>
-              <a:rPr lang="en-US" b="1" dirty="0" smtClean="0"/>
-              <a:t>Audio recording </a:t>
-            </a:r>
-            <a:endParaRPr lang="en-US" dirty="0" smtClean="0"/>
+              <a:rPr lang="en-US" sz="3200" b="1" dirty="0" smtClean="0"/>
+              <a:t>Evaluation </a:t>
+            </a:r>
+            <a:r>
+              <a:rPr lang="en-US" sz="3200" b="1" dirty="0" smtClean="0"/>
+              <a:t>module </a:t>
+            </a:r>
+            <a:endParaRPr lang="en-US" sz="3200" b="1" dirty="0" smtClean="0"/>
           </a:p>
           <a:p>
             <a:pPr fontAlgn="base">
@@ -6864,23 +6805,11 @@
             </a:pPr>
             <a:r>
               <a:rPr lang="en-US" dirty="0" smtClean="0"/>
-              <a:t>	Enables the user </a:t>
-            </a:r>
-            <a:r>
-              <a:rPr lang="en-US" dirty="0" smtClean="0"/>
-              <a:t>to </a:t>
-            </a:r>
-            <a:r>
-              <a:rPr lang="en-US" dirty="0" smtClean="0"/>
-              <a:t>record new </a:t>
-            </a:r>
-            <a:r>
-              <a:rPr lang="en-US" dirty="0" smtClean="0"/>
-              <a:t>sound files within the </a:t>
-            </a:r>
-            <a:r>
-              <a:rPr lang="en-US" dirty="0" smtClean="0"/>
-              <a:t>application</a:t>
+              <a:t>	</a:t>
+            </a:r>
+            <a:r>
+              <a:rPr lang="en-US" dirty="0" smtClean="0"/>
+              <a:t>Facilitates research by automatically simulating recognition on a test set of audio samples. Reports recognition accuracy rates and confusion matrix.</a:t>
             </a:r>
             <a:endParaRPr lang="en-US" dirty="0" smtClean="0"/>
           </a:p>
@@ -6891,34 +6820,10 @@
               </a:buClr>
             </a:pPr>
             <a:r>
-              <a:rPr lang="en-US" b="1" dirty="0" smtClean="0"/>
-              <a:t>Discriminative </a:t>
-            </a:r>
-            <a:r>
-              <a:rPr lang="en-US" b="1" dirty="0" smtClean="0"/>
-              <a:t>training </a:t>
-            </a:r>
-            <a:r>
-              <a:rPr lang="en-US" dirty="0" smtClean="0"/>
-              <a:t>[2] </a:t>
-            </a:r>
-          </a:p>
-          <a:p>
-            <a:pPr fontAlgn="base">
-              <a:buClr>
-                <a:schemeClr val="accent4"/>
-              </a:buClr>
-              <a:buNone/>
-            </a:pPr>
-            <a:r>
-              <a:rPr lang="en-US" dirty="0" smtClean="0"/>
-              <a:t>	</a:t>
-            </a:r>
-            <a:r>
-              <a:rPr lang="en-US" dirty="0" smtClean="0"/>
-              <a:t>An additional training step that removes any pronunciations in the lexicon that may reduce recognition accuracy by matching multiple words in the vocabulary</a:t>
-            </a:r>
-            <a:endParaRPr lang="en-US" dirty="0"/>
+              <a:rPr lang="en-US" sz="3200" b="1" dirty="0" smtClean="0"/>
+              <a:t>Built-in audio recorder</a:t>
+            </a:r>
+            <a:endParaRPr lang="en-US" sz="3200" dirty="0" smtClean="0"/>
           </a:p>
         </p:txBody>
       </p:sp>
@@ -6931,7 +6836,7 @@
           <p:nvPr/>
         </p:nvGraphicFramePr>
         <p:xfrm>
-          <a:off x="20879422" y="10598060"/>
+          <a:off x="20879422" y="19981692"/>
           <a:ext cx="1608137" cy="509587"/>
         </p:xfrm>
         <a:graphic>
@@ -6942,6 +6847,181 @@
           </a:graphicData>
         </a:graphic>
       </p:graphicFrame>
+      <p:sp>
+        <p:nvSpPr>
+          <p:cNvPr id="45" name="Content Placeholder 11"/>
+          <p:cNvSpPr txBox="1">
+            <a:spLocks/>
+          </p:cNvSpPr>
+          <p:nvPr/>
+        </p:nvSpPr>
+        <p:spPr>
+          <a:xfrm>
+            <a:off x="29935055" y="30632400"/>
+            <a:ext cx="12817908" cy="1565701"/>
+          </a:xfrm>
+          <a:prstGeom prst="rect">
+            <a:avLst/>
+          </a:prstGeom>
+          <a:ln w="3175">
+            <a:solidFill>
+              <a:schemeClr val="accent1"/>
+            </a:solidFill>
+          </a:ln>
+        </p:spPr>
+        <p:txBody>
+          <a:bodyPr vert="horz" lIns="365760" tIns="182880" rIns="91440" bIns="45720" rtlCol="0">
+            <a:noAutofit/>
+          </a:bodyPr>
+          <a:lstStyle/>
+          <a:p>
+            <a:pPr lvl="0" defTabSz="4389120">
+              <a:spcBef>
+                <a:spcPts val="600"/>
+              </a:spcBef>
+              <a:buClr>
+                <a:schemeClr val="accent2"/>
+              </a:buClr>
+              <a:defRPr/>
+            </a:pPr>
+            <a:r>
+              <a:rPr lang="en-US" sz="2800" b="1" dirty="0" smtClean="0"/>
+              <a:t>Acknowledgments</a:t>
+            </a:r>
+            <a:endParaRPr lang="en-US" sz="2800" b="1" dirty="0" smtClean="0"/>
+          </a:p>
+          <a:p>
+            <a:pPr marL="0" marR="0" lvl="0" indent="0" algn="l" defTabSz="4389120" rtl="0" eaLnBrk="1" fontAlgn="auto" latinLnBrk="0" hangingPunct="1">
+              <a:lnSpc>
+                <a:spcPct val="100000"/>
+              </a:lnSpc>
+              <a:spcBef>
+                <a:spcPts val="600"/>
+              </a:spcBef>
+              <a:spcAft>
+                <a:spcPts val="0"/>
+              </a:spcAft>
+              <a:buClr>
+                <a:schemeClr val="accent2"/>
+              </a:buClr>
+              <a:buSzTx/>
+              <a:buFont typeface="Arial" panose="020B0604020202020204" pitchFamily="34" charset="0"/>
+              <a:buNone/>
+              <a:tabLst/>
+              <a:defRPr/>
+            </a:pPr>
+            <a:r>
+              <a:rPr kumimoji="0" lang="en-US" sz="2400" i="0" u="none" strike="noStrike" kern="1200" cap="none" spc="0" normalizeH="0" baseline="0" noProof="0" dirty="0" smtClean="0">
+                <a:ln>
+                  <a:noFill/>
+                </a:ln>
+                <a:effectLst/>
+                <a:uLnTx/>
+                <a:uFillTx/>
+                <a:latin typeface="+mn-lt"/>
+                <a:ea typeface="+mn-ea"/>
+                <a:cs typeface="+mn-cs"/>
+              </a:rPr>
+              <a:t>Many thanks to </a:t>
+            </a:r>
+            <a:r>
+              <a:rPr kumimoji="0" lang="en-US" sz="2400" i="0" u="none" strike="noStrike" kern="1200" cap="none" spc="0" normalizeH="0" baseline="0" noProof="0" dirty="0" err="1" smtClean="0">
+                <a:ln>
+                  <a:noFill/>
+                </a:ln>
+                <a:effectLst/>
+                <a:uLnTx/>
+                <a:uFillTx/>
+                <a:latin typeface="+mn-lt"/>
+                <a:ea typeface="+mn-ea"/>
+                <a:cs typeface="+mn-cs"/>
+              </a:rPr>
+              <a:t>Roni</a:t>
+            </a:r>
+            <a:r>
+              <a:rPr kumimoji="0" lang="en-US" sz="2400" i="0" u="none" strike="noStrike" kern="1200" cap="none" spc="0" normalizeH="0" baseline="0" noProof="0" dirty="0" smtClean="0">
+                <a:ln>
+                  <a:noFill/>
+                </a:ln>
+                <a:effectLst/>
+                <a:uLnTx/>
+                <a:uFillTx/>
+                <a:latin typeface="+mn-lt"/>
+                <a:ea typeface="+mn-ea"/>
+                <a:cs typeface="+mn-cs"/>
+              </a:rPr>
+              <a:t> Rosenfeld, </a:t>
+            </a:r>
+            <a:r>
+              <a:rPr kumimoji="0" lang="en-US" sz="2400" i="0" u="none" strike="noStrike" kern="1200" cap="none" spc="0" normalizeH="0" baseline="0" noProof="0" dirty="0" err="1" smtClean="0">
+                <a:ln>
+                  <a:noFill/>
+                </a:ln>
+                <a:effectLst/>
+                <a:uLnTx/>
+                <a:uFillTx/>
+                <a:latin typeface="+mn-lt"/>
+                <a:ea typeface="+mn-ea"/>
+                <a:cs typeface="+mn-cs"/>
+              </a:rPr>
+              <a:t>Hao</a:t>
+            </a:r>
+            <a:r>
+              <a:rPr kumimoji="0" lang="en-US" sz="2400" i="0" u="none" strike="noStrike" kern="1200" cap="none" spc="0" normalizeH="0" baseline="0" noProof="0" dirty="0" smtClean="0">
+                <a:ln>
+                  <a:noFill/>
+                </a:ln>
+                <a:effectLst/>
+                <a:uLnTx/>
+                <a:uFillTx/>
+                <a:latin typeface="+mn-lt"/>
+                <a:ea typeface="+mn-ea"/>
+                <a:cs typeface="+mn-cs"/>
+              </a:rPr>
+              <a:t> Yee Chan, and Mark </a:t>
+            </a:r>
+            <a:r>
+              <a:rPr kumimoji="0" lang="en-US" sz="2400" i="0" u="none" strike="noStrike" kern="1200" cap="none" spc="0" normalizeH="0" baseline="0" noProof="0" dirty="0" err="1" smtClean="0">
+                <a:ln>
+                  <a:noFill/>
+                </a:ln>
+                <a:effectLst/>
+                <a:uLnTx/>
+                <a:uFillTx/>
+                <a:latin typeface="+mn-lt"/>
+                <a:ea typeface="+mn-ea"/>
+                <a:cs typeface="+mn-cs"/>
+              </a:rPr>
+              <a:t>Qiao</a:t>
+            </a:r>
+            <a:r>
+              <a:rPr kumimoji="0" lang="en-US" sz="2400" i="0" u="none" strike="noStrike" kern="1200" cap="none" spc="0" normalizeH="0" noProof="0" dirty="0" smtClean="0">
+                <a:ln>
+                  <a:noFill/>
+                </a:ln>
+                <a:effectLst/>
+                <a:uLnTx/>
+                <a:uFillTx/>
+                <a:latin typeface="+mn-lt"/>
+                <a:ea typeface="+mn-ea"/>
+                <a:cs typeface="+mn-cs"/>
+              </a:rPr>
+              <a:t> for generously sharing their data and providing valuable advice on implementing the Salaam method. </a:t>
+            </a:r>
+            <a:endParaRPr kumimoji="0" lang="en-US" sz="2800" i="0" u="none" strike="noStrike" kern="1200" cap="none" spc="0" normalizeH="0" baseline="0" noProof="0" dirty="0">
+              <a:ln>
+                <a:noFill/>
+              </a:ln>
+              <a:effectLst/>
+              <a:uLnTx/>
+              <a:uFillTx/>
+              <a:latin typeface="+mn-lt"/>
+              <a:ea typeface="+mn-ea"/>
+              <a:cs typeface="+mn-cs"/>
+            </a:endParaRPr>
+          </a:p>
+        </p:txBody>
+      </p:sp>
     </p:spTree>
     <p:extLst>
       <p:ext uri="{BB962C8B-B14F-4D97-AF65-F5344CB8AC3E}">

</xml_diff>